<commit_message>
Final version of ppt. Minor changes in app imports.
</commit_message>
<xml_diff>
--- a/presentations/business/pnos_business_ppt.pptx
+++ b/presentations/business/pnos_business_ppt.pptx
@@ -6832,7 +6832,7 @@
           <a:p>
             <a:fld id="{B9A9EE70-06A6-5645-802D-4F9862C567B5}" type="datetimeFigureOut">
               <a:rPr lang="pl-PL" smtClean="0"/>
-              <a:t>24.11.2019</a:t>
+              <a:t>25.11.2019</a:t>
             </a:fld>
             <a:endParaRPr lang="pl-PL"/>
           </a:p>
@@ -8005,7 +8005,7 @@
           <a:p>
             <a:fld id="{BDB90D4E-B4B4-AA4D-8C3E-EED2DA1EB551}" type="datetimeFigureOut">
               <a:rPr lang="pl-PL" smtClean="0"/>
-              <a:t>24.11.2019</a:t>
+              <a:t>25.11.2019</a:t>
             </a:fld>
             <a:endParaRPr lang="pl-PL"/>
           </a:p>
@@ -8205,7 +8205,7 @@
           <a:p>
             <a:fld id="{BDB90D4E-B4B4-AA4D-8C3E-EED2DA1EB551}" type="datetimeFigureOut">
               <a:rPr lang="pl-PL" smtClean="0"/>
-              <a:t>24.11.2019</a:t>
+              <a:t>25.11.2019</a:t>
             </a:fld>
             <a:endParaRPr lang="pl-PL"/>
           </a:p>
@@ -8415,7 +8415,7 @@
           <a:p>
             <a:fld id="{BDB90D4E-B4B4-AA4D-8C3E-EED2DA1EB551}" type="datetimeFigureOut">
               <a:rPr lang="pl-PL" smtClean="0"/>
-              <a:t>24.11.2019</a:t>
+              <a:t>25.11.2019</a:t>
             </a:fld>
             <a:endParaRPr lang="pl-PL"/>
           </a:p>
@@ -8615,7 +8615,7 @@
           <a:p>
             <a:fld id="{BDB90D4E-B4B4-AA4D-8C3E-EED2DA1EB551}" type="datetimeFigureOut">
               <a:rPr lang="pl-PL" smtClean="0"/>
-              <a:t>24.11.2019</a:t>
+              <a:t>25.11.2019</a:t>
             </a:fld>
             <a:endParaRPr lang="pl-PL"/>
           </a:p>
@@ -8891,7 +8891,7 @@
           <a:p>
             <a:fld id="{BDB90D4E-B4B4-AA4D-8C3E-EED2DA1EB551}" type="datetimeFigureOut">
               <a:rPr lang="pl-PL" smtClean="0"/>
-              <a:t>24.11.2019</a:t>
+              <a:t>25.11.2019</a:t>
             </a:fld>
             <a:endParaRPr lang="pl-PL"/>
           </a:p>
@@ -9159,7 +9159,7 @@
           <a:p>
             <a:fld id="{BDB90D4E-B4B4-AA4D-8C3E-EED2DA1EB551}" type="datetimeFigureOut">
               <a:rPr lang="pl-PL" smtClean="0"/>
-              <a:t>24.11.2019</a:t>
+              <a:t>25.11.2019</a:t>
             </a:fld>
             <a:endParaRPr lang="pl-PL"/>
           </a:p>
@@ -9574,7 +9574,7 @@
           <a:p>
             <a:fld id="{BDB90D4E-B4B4-AA4D-8C3E-EED2DA1EB551}" type="datetimeFigureOut">
               <a:rPr lang="pl-PL" smtClean="0"/>
-              <a:t>24.11.2019</a:t>
+              <a:t>25.11.2019</a:t>
             </a:fld>
             <a:endParaRPr lang="pl-PL"/>
           </a:p>
@@ -9716,7 +9716,7 @@
           <a:p>
             <a:fld id="{BDB90D4E-B4B4-AA4D-8C3E-EED2DA1EB551}" type="datetimeFigureOut">
               <a:rPr lang="pl-PL" smtClean="0"/>
-              <a:t>24.11.2019</a:t>
+              <a:t>25.11.2019</a:t>
             </a:fld>
             <a:endParaRPr lang="pl-PL"/>
           </a:p>
@@ -9829,7 +9829,7 @@
           <a:p>
             <a:fld id="{BDB90D4E-B4B4-AA4D-8C3E-EED2DA1EB551}" type="datetimeFigureOut">
               <a:rPr lang="pl-PL" smtClean="0"/>
-              <a:t>24.11.2019</a:t>
+              <a:t>25.11.2019</a:t>
             </a:fld>
             <a:endParaRPr lang="pl-PL"/>
           </a:p>
@@ -10142,7 +10142,7 @@
           <a:p>
             <a:fld id="{BDB90D4E-B4B4-AA4D-8C3E-EED2DA1EB551}" type="datetimeFigureOut">
               <a:rPr lang="pl-PL" smtClean="0"/>
-              <a:t>24.11.2019</a:t>
+              <a:t>25.11.2019</a:t>
             </a:fld>
             <a:endParaRPr lang="pl-PL"/>
           </a:p>
@@ -10431,7 +10431,7 @@
           <a:p>
             <a:fld id="{BDB90D4E-B4B4-AA4D-8C3E-EED2DA1EB551}" type="datetimeFigureOut">
               <a:rPr lang="pl-PL" smtClean="0"/>
-              <a:t>24.11.2019</a:t>
+              <a:t>25.11.2019</a:t>
             </a:fld>
             <a:endParaRPr lang="pl-PL"/>
           </a:p>
@@ -10674,7 +10674,7 @@
           <a:p>
             <a:fld id="{BDB90D4E-B4B4-AA4D-8C3E-EED2DA1EB551}" type="datetimeFigureOut">
               <a:rPr lang="pl-PL" smtClean="0"/>
-              <a:t>24.11.2019</a:t>
+              <a:t>25.11.2019</a:t>
             </a:fld>
             <a:endParaRPr lang="pl-PL"/>
           </a:p>
@@ -11457,7 +11457,55 @@
                 <a:latin typeface="Futura Medium" panose="020B0602020204020303" pitchFamily="34" charset="-79"/>
                 <a:cs typeface="Futura Medium" panose="020B0602020204020303" pitchFamily="34" charset="-79"/>
               </a:rPr>
-              <a:t> trend?</a:t>
+              <a:t> </a:t>
+            </a:r>
+            <a:r>
+              <a:rPr lang="pl-PL" sz="3200" dirty="0" err="1">
+                <a:solidFill>
+                  <a:schemeClr val="accent1">
+                    <a:lumMod val="75000"/>
+                  </a:schemeClr>
+                </a:solidFill>
+                <a:latin typeface="Futura Medium" panose="020B0602020204020303" pitchFamily="34" charset="-79"/>
+                <a:cs typeface="Futura Medium" panose="020B0602020204020303" pitchFamily="34" charset="-79"/>
+              </a:rPr>
+              <a:t>something</a:t>
+            </a:r>
+            <a:r>
+              <a:rPr lang="pl-PL" sz="3200" dirty="0">
+                <a:solidFill>
+                  <a:schemeClr val="accent1">
+                    <a:lumMod val="75000"/>
+                  </a:schemeClr>
+                </a:solidFill>
+                <a:latin typeface="Futura Medium" panose="020B0602020204020303" pitchFamily="34" charset="-79"/>
+                <a:cs typeface="Futura Medium" panose="020B0602020204020303" pitchFamily="34" charset="-79"/>
+              </a:rPr>
+              <a:t> </a:t>
+            </a:r>
+            <a:r>
+              <a:rPr lang="pl-PL" sz="3200" dirty="0" err="1">
+                <a:solidFill>
+                  <a:schemeClr val="accent1">
+                    <a:lumMod val="75000"/>
+                  </a:schemeClr>
+                </a:solidFill>
+                <a:latin typeface="Futura Medium" panose="020B0602020204020303" pitchFamily="34" charset="-79"/>
+                <a:cs typeface="Futura Medium" panose="020B0602020204020303" pitchFamily="34" charset="-79"/>
+              </a:rPr>
+              <a:t>useful</a:t>
+            </a:r>
+            <a:r>
+              <a:rPr lang="pl-PL" sz="3200" dirty="0">
+                <a:solidFill>
+                  <a:schemeClr val="accent1">
+                    <a:lumMod val="75000"/>
+                  </a:schemeClr>
+                </a:solidFill>
+                <a:latin typeface="Futura Medium" panose="020B0602020204020303" pitchFamily="34" charset="-79"/>
+                <a:cs typeface="Futura Medium" panose="020B0602020204020303" pitchFamily="34" charset="-79"/>
+              </a:rPr>
+              <a:t>?</a:t>
             </a:r>
           </a:p>
         </p:txBody>
@@ -12126,7 +12174,55 @@
                 <a:latin typeface="Futura Medium" panose="020B0602020204020303" pitchFamily="34" charset="-79"/>
                 <a:cs typeface="Futura Medium" panose="020B0602020204020303" pitchFamily="34" charset="-79"/>
               </a:rPr>
-              <a:t> trend?</a:t>
+              <a:t> </a:t>
+            </a:r>
+            <a:r>
+              <a:rPr lang="pl-PL" sz="3200" dirty="0" err="1">
+                <a:solidFill>
+                  <a:schemeClr val="accent1">
+                    <a:lumMod val="75000"/>
+                  </a:schemeClr>
+                </a:solidFill>
+                <a:latin typeface="Futura Medium" panose="020B0602020204020303" pitchFamily="34" charset="-79"/>
+                <a:cs typeface="Futura Medium" panose="020B0602020204020303" pitchFamily="34" charset="-79"/>
+              </a:rPr>
+              <a:t>something</a:t>
+            </a:r>
+            <a:r>
+              <a:rPr lang="pl-PL" sz="3200" dirty="0">
+                <a:solidFill>
+                  <a:schemeClr val="accent1">
+                    <a:lumMod val="75000"/>
+                  </a:schemeClr>
+                </a:solidFill>
+                <a:latin typeface="Futura Medium" panose="020B0602020204020303" pitchFamily="34" charset="-79"/>
+                <a:cs typeface="Futura Medium" panose="020B0602020204020303" pitchFamily="34" charset="-79"/>
+              </a:rPr>
+              <a:t> </a:t>
+            </a:r>
+            <a:r>
+              <a:rPr lang="pl-PL" sz="3200" dirty="0" err="1">
+                <a:solidFill>
+                  <a:schemeClr val="accent1">
+                    <a:lumMod val="75000"/>
+                  </a:schemeClr>
+                </a:solidFill>
+                <a:latin typeface="Futura Medium" panose="020B0602020204020303" pitchFamily="34" charset="-79"/>
+                <a:cs typeface="Futura Medium" panose="020B0602020204020303" pitchFamily="34" charset="-79"/>
+              </a:rPr>
+              <a:t>useful</a:t>
+            </a:r>
+            <a:r>
+              <a:rPr lang="pl-PL" sz="3200" dirty="0">
+                <a:solidFill>
+                  <a:schemeClr val="accent1">
+                    <a:lumMod val="75000"/>
+                  </a:schemeClr>
+                </a:solidFill>
+                <a:latin typeface="Futura Medium" panose="020B0602020204020303" pitchFamily="34" charset="-79"/>
+                <a:cs typeface="Futura Medium" panose="020B0602020204020303" pitchFamily="34" charset="-79"/>
+              </a:rPr>
+              <a:t>?</a:t>
             </a:r>
           </a:p>
         </p:txBody>
@@ -12279,7 +12375,55 @@
                 <a:latin typeface="Futura Medium" panose="020B0602020204020303" pitchFamily="34" charset="-79"/>
                 <a:cs typeface="Futura Medium" panose="020B0602020204020303" pitchFamily="34" charset="-79"/>
               </a:rPr>
-              <a:t> trend?</a:t>
+              <a:t> </a:t>
+            </a:r>
+            <a:r>
+              <a:rPr lang="pl-PL" sz="3200" dirty="0" err="1">
+                <a:solidFill>
+                  <a:schemeClr val="accent1">
+                    <a:lumMod val="75000"/>
+                  </a:schemeClr>
+                </a:solidFill>
+                <a:latin typeface="Futura Medium" panose="020B0602020204020303" pitchFamily="34" charset="-79"/>
+                <a:cs typeface="Futura Medium" panose="020B0602020204020303" pitchFamily="34" charset="-79"/>
+              </a:rPr>
+              <a:t>something</a:t>
+            </a:r>
+            <a:r>
+              <a:rPr lang="pl-PL" sz="3200" dirty="0">
+                <a:solidFill>
+                  <a:schemeClr val="accent1">
+                    <a:lumMod val="75000"/>
+                  </a:schemeClr>
+                </a:solidFill>
+                <a:latin typeface="Futura Medium" panose="020B0602020204020303" pitchFamily="34" charset="-79"/>
+                <a:cs typeface="Futura Medium" panose="020B0602020204020303" pitchFamily="34" charset="-79"/>
+              </a:rPr>
+              <a:t> </a:t>
+            </a:r>
+            <a:r>
+              <a:rPr lang="pl-PL" sz="3200" dirty="0" err="1">
+                <a:solidFill>
+                  <a:schemeClr val="accent1">
+                    <a:lumMod val="75000"/>
+                  </a:schemeClr>
+                </a:solidFill>
+                <a:latin typeface="Futura Medium" panose="020B0602020204020303" pitchFamily="34" charset="-79"/>
+                <a:cs typeface="Futura Medium" panose="020B0602020204020303" pitchFamily="34" charset="-79"/>
+              </a:rPr>
+              <a:t>useful</a:t>
+            </a:r>
+            <a:r>
+              <a:rPr lang="pl-PL" sz="3200" dirty="0">
+                <a:solidFill>
+                  <a:schemeClr val="accent1">
+                    <a:lumMod val="75000"/>
+                  </a:schemeClr>
+                </a:solidFill>
+                <a:latin typeface="Futura Medium" panose="020B0602020204020303" pitchFamily="34" charset="-79"/>
+                <a:cs typeface="Futura Medium" panose="020B0602020204020303" pitchFamily="34" charset="-79"/>
+              </a:rPr>
+              <a:t>?</a:t>
             </a:r>
           </a:p>
         </p:txBody>
@@ -12718,7 +12862,55 @@
                 <a:latin typeface="Futura Medium" panose="020B0602020204020303" pitchFamily="34" charset="-79"/>
                 <a:cs typeface="Futura Medium" panose="020B0602020204020303" pitchFamily="34" charset="-79"/>
               </a:rPr>
-              <a:t> trend?</a:t>
+              <a:t> </a:t>
+            </a:r>
+            <a:r>
+              <a:rPr lang="pl-PL" sz="3200" dirty="0" err="1">
+                <a:solidFill>
+                  <a:schemeClr val="accent1">
+                    <a:lumMod val="75000"/>
+                  </a:schemeClr>
+                </a:solidFill>
+                <a:latin typeface="Futura Medium" panose="020B0602020204020303" pitchFamily="34" charset="-79"/>
+                <a:cs typeface="Futura Medium" panose="020B0602020204020303" pitchFamily="34" charset="-79"/>
+              </a:rPr>
+              <a:t>something</a:t>
+            </a:r>
+            <a:r>
+              <a:rPr lang="pl-PL" sz="3200" dirty="0">
+                <a:solidFill>
+                  <a:schemeClr val="accent1">
+                    <a:lumMod val="75000"/>
+                  </a:schemeClr>
+                </a:solidFill>
+                <a:latin typeface="Futura Medium" panose="020B0602020204020303" pitchFamily="34" charset="-79"/>
+                <a:cs typeface="Futura Medium" panose="020B0602020204020303" pitchFamily="34" charset="-79"/>
+              </a:rPr>
+              <a:t> </a:t>
+            </a:r>
+            <a:r>
+              <a:rPr lang="pl-PL" sz="3200" dirty="0" err="1">
+                <a:solidFill>
+                  <a:schemeClr val="accent1">
+                    <a:lumMod val="75000"/>
+                  </a:schemeClr>
+                </a:solidFill>
+                <a:latin typeface="Futura Medium" panose="020B0602020204020303" pitchFamily="34" charset="-79"/>
+                <a:cs typeface="Futura Medium" panose="020B0602020204020303" pitchFamily="34" charset="-79"/>
+              </a:rPr>
+              <a:t>useful</a:t>
+            </a:r>
+            <a:r>
+              <a:rPr lang="pl-PL" sz="3200" dirty="0">
+                <a:solidFill>
+                  <a:schemeClr val="accent1">
+                    <a:lumMod val="75000"/>
+                  </a:schemeClr>
+                </a:solidFill>
+                <a:latin typeface="Futura Medium" panose="020B0602020204020303" pitchFamily="34" charset="-79"/>
+                <a:cs typeface="Futura Medium" panose="020B0602020204020303" pitchFamily="34" charset="-79"/>
+              </a:rPr>
+              <a:t>?</a:t>
             </a:r>
           </a:p>
         </p:txBody>
@@ -13300,7 +13492,55 @@
                 <a:latin typeface="Futura Medium" panose="020B0602020204020303" pitchFamily="34" charset="-79"/>
                 <a:cs typeface="Futura Medium" panose="020B0602020204020303" pitchFamily="34" charset="-79"/>
               </a:rPr>
-              <a:t> trend?</a:t>
+              <a:t> </a:t>
+            </a:r>
+            <a:r>
+              <a:rPr lang="pl-PL" sz="3200" dirty="0" err="1">
+                <a:solidFill>
+                  <a:schemeClr val="accent1">
+                    <a:lumMod val="75000"/>
+                  </a:schemeClr>
+                </a:solidFill>
+                <a:latin typeface="Futura Medium" panose="020B0602020204020303" pitchFamily="34" charset="-79"/>
+                <a:cs typeface="Futura Medium" panose="020B0602020204020303" pitchFamily="34" charset="-79"/>
+              </a:rPr>
+              <a:t>something</a:t>
+            </a:r>
+            <a:r>
+              <a:rPr lang="pl-PL" sz="3200" dirty="0">
+                <a:solidFill>
+                  <a:schemeClr val="accent1">
+                    <a:lumMod val="75000"/>
+                  </a:schemeClr>
+                </a:solidFill>
+                <a:latin typeface="Futura Medium" panose="020B0602020204020303" pitchFamily="34" charset="-79"/>
+                <a:cs typeface="Futura Medium" panose="020B0602020204020303" pitchFamily="34" charset="-79"/>
+              </a:rPr>
+              <a:t> </a:t>
+            </a:r>
+            <a:r>
+              <a:rPr lang="pl-PL" sz="3200" dirty="0" err="1">
+                <a:solidFill>
+                  <a:schemeClr val="accent1">
+                    <a:lumMod val="75000"/>
+                  </a:schemeClr>
+                </a:solidFill>
+                <a:latin typeface="Futura Medium" panose="020B0602020204020303" pitchFamily="34" charset="-79"/>
+                <a:cs typeface="Futura Medium" panose="020B0602020204020303" pitchFamily="34" charset="-79"/>
+              </a:rPr>
+              <a:t>useful</a:t>
+            </a:r>
+            <a:r>
+              <a:rPr lang="pl-PL" sz="3200" dirty="0">
+                <a:solidFill>
+                  <a:schemeClr val="accent1">
+                    <a:lumMod val="75000"/>
+                  </a:schemeClr>
+                </a:solidFill>
+                <a:latin typeface="Futura Medium" panose="020B0602020204020303" pitchFamily="34" charset="-79"/>
+                <a:cs typeface="Futura Medium" panose="020B0602020204020303" pitchFamily="34" charset="-79"/>
+              </a:rPr>
+              <a:t>?</a:t>
             </a:r>
           </a:p>
         </p:txBody>
@@ -13990,7 +14230,55 @@
                 <a:latin typeface="Futura Medium" panose="020B0602020204020303" pitchFamily="34" charset="-79"/>
                 <a:cs typeface="Futura Medium" panose="020B0602020204020303" pitchFamily="34" charset="-79"/>
               </a:rPr>
-              <a:t> trend?</a:t>
+              <a:t> </a:t>
+            </a:r>
+            <a:r>
+              <a:rPr lang="pl-PL" sz="3200" dirty="0" err="1">
+                <a:solidFill>
+                  <a:schemeClr val="accent1">
+                    <a:lumMod val="75000"/>
+                  </a:schemeClr>
+                </a:solidFill>
+                <a:latin typeface="Futura Medium" panose="020B0602020204020303" pitchFamily="34" charset="-79"/>
+                <a:cs typeface="Futura Medium" panose="020B0602020204020303" pitchFamily="34" charset="-79"/>
+              </a:rPr>
+              <a:t>something</a:t>
+            </a:r>
+            <a:r>
+              <a:rPr lang="pl-PL" sz="3200" dirty="0">
+                <a:solidFill>
+                  <a:schemeClr val="accent1">
+                    <a:lumMod val="75000"/>
+                  </a:schemeClr>
+                </a:solidFill>
+                <a:latin typeface="Futura Medium" panose="020B0602020204020303" pitchFamily="34" charset="-79"/>
+                <a:cs typeface="Futura Medium" panose="020B0602020204020303" pitchFamily="34" charset="-79"/>
+              </a:rPr>
+              <a:t> </a:t>
+            </a:r>
+            <a:r>
+              <a:rPr lang="pl-PL" sz="3200" dirty="0" err="1">
+                <a:solidFill>
+                  <a:schemeClr val="accent1">
+                    <a:lumMod val="75000"/>
+                  </a:schemeClr>
+                </a:solidFill>
+                <a:latin typeface="Futura Medium" panose="020B0602020204020303" pitchFamily="34" charset="-79"/>
+                <a:cs typeface="Futura Medium" panose="020B0602020204020303" pitchFamily="34" charset="-79"/>
+              </a:rPr>
+              <a:t>useful</a:t>
+            </a:r>
+            <a:r>
+              <a:rPr lang="pl-PL" sz="3200" dirty="0">
+                <a:solidFill>
+                  <a:schemeClr val="accent1">
+                    <a:lumMod val="75000"/>
+                  </a:schemeClr>
+                </a:solidFill>
+                <a:latin typeface="Futura Medium" panose="020B0602020204020303" pitchFamily="34" charset="-79"/>
+                <a:cs typeface="Futura Medium" panose="020B0602020204020303" pitchFamily="34" charset="-79"/>
+              </a:rPr>
+              <a:t>?</a:t>
             </a:r>
           </a:p>
         </p:txBody>
@@ -14997,7 +15285,55 @@
                 <a:latin typeface="Futura Medium" panose="020B0602020204020303" pitchFamily="34" charset="-79"/>
                 <a:cs typeface="Futura Medium" panose="020B0602020204020303" pitchFamily="34" charset="-79"/>
               </a:rPr>
-              <a:t> trend?</a:t>
+              <a:t> </a:t>
+            </a:r>
+            <a:r>
+              <a:rPr lang="pl-PL" sz="3200" dirty="0" err="1">
+                <a:solidFill>
+                  <a:schemeClr val="accent1">
+                    <a:lumMod val="75000"/>
+                  </a:schemeClr>
+                </a:solidFill>
+                <a:latin typeface="Futura Medium" panose="020B0602020204020303" pitchFamily="34" charset="-79"/>
+                <a:cs typeface="Futura Medium" panose="020B0602020204020303" pitchFamily="34" charset="-79"/>
+              </a:rPr>
+              <a:t>something</a:t>
+            </a:r>
+            <a:r>
+              <a:rPr lang="pl-PL" sz="3200" dirty="0">
+                <a:solidFill>
+                  <a:schemeClr val="accent1">
+                    <a:lumMod val="75000"/>
+                  </a:schemeClr>
+                </a:solidFill>
+                <a:latin typeface="Futura Medium" panose="020B0602020204020303" pitchFamily="34" charset="-79"/>
+                <a:cs typeface="Futura Medium" panose="020B0602020204020303" pitchFamily="34" charset="-79"/>
+              </a:rPr>
+              <a:t> </a:t>
+            </a:r>
+            <a:r>
+              <a:rPr lang="pl-PL" sz="3200" dirty="0" err="1">
+                <a:solidFill>
+                  <a:schemeClr val="accent1">
+                    <a:lumMod val="75000"/>
+                  </a:schemeClr>
+                </a:solidFill>
+                <a:latin typeface="Futura Medium" panose="020B0602020204020303" pitchFamily="34" charset="-79"/>
+                <a:cs typeface="Futura Medium" panose="020B0602020204020303" pitchFamily="34" charset="-79"/>
+              </a:rPr>
+              <a:t>useful</a:t>
+            </a:r>
+            <a:r>
+              <a:rPr lang="pl-PL" sz="3200" dirty="0">
+                <a:solidFill>
+                  <a:schemeClr val="accent1">
+                    <a:lumMod val="75000"/>
+                  </a:schemeClr>
+                </a:solidFill>
+                <a:latin typeface="Futura Medium" panose="020B0602020204020303" pitchFamily="34" charset="-79"/>
+                <a:cs typeface="Futura Medium" panose="020B0602020204020303" pitchFamily="34" charset="-79"/>
+              </a:rPr>
+              <a:t>?</a:t>
             </a:r>
           </a:p>
         </p:txBody>
@@ -17028,11 +17364,21 @@
                 <a:latin typeface="Futura Medium" panose="020B0602020204020303" pitchFamily="34" charset="-79"/>
                 <a:cs typeface="Futura Medium" panose="020B0602020204020303" pitchFamily="34" charset="-79"/>
               </a:rPr>
-              <a:t> </a:t>
+              <a:t> (</a:t>
             </a:r>
             <a:r>
               <a:rPr lang="pl-PL" sz="2000" dirty="0" err="1">
                 <a:solidFill>
+                  <a:schemeClr val="accent2"/>
+                </a:solidFill>
+                <a:latin typeface="Futura Medium" panose="020B0602020204020303" pitchFamily="34" charset="-79"/>
+                <a:cs typeface="Futura Medium" panose="020B0602020204020303" pitchFamily="34" charset="-79"/>
+              </a:rPr>
+              <a:t>classify</a:t>
+            </a:r>
+            <a:r>
+              <a:rPr lang="pl-PL" sz="2000" dirty="0">
+                <a:solidFill>
                   <a:schemeClr val="bg2">
                     <a:lumMod val="75000"/>
                   </a:schemeClr>
@@ -17040,6 +17386,18 @@
                 <a:latin typeface="Futura Medium" panose="020B0602020204020303" pitchFamily="34" charset="-79"/>
                 <a:cs typeface="Futura Medium" panose="020B0602020204020303" pitchFamily="34" charset="-79"/>
               </a:rPr>
+              <a:t>) </a:t>
+            </a:r>
+            <a:r>
+              <a:rPr lang="pl-PL" sz="2000" dirty="0" err="1">
+                <a:solidFill>
+                  <a:schemeClr val="bg2">
+                    <a:lumMod val="75000"/>
+                  </a:schemeClr>
+                </a:solidFill>
+                <a:latin typeface="Futura Medium" panose="020B0602020204020303" pitchFamily="34" charset="-79"/>
+                <a:cs typeface="Futura Medium" panose="020B0602020204020303" pitchFamily="34" charset="-79"/>
+              </a:rPr>
               <a:t>customers</a:t>
             </a:r>
             <a:r>
@@ -17076,7 +17434,29 @@
                 <a:latin typeface="Futura Medium" panose="020B0602020204020303" pitchFamily="34" charset="-79"/>
                 <a:cs typeface="Futura Medium" panose="020B0602020204020303" pitchFamily="34" charset="-79"/>
               </a:rPr>
-              <a:t> </a:t>
+              <a:t> (</a:t>
+            </a:r>
+            <a:r>
+              <a:rPr lang="pl-PL" sz="2000" dirty="0" err="1">
+                <a:solidFill>
+                  <a:schemeClr val="accent2"/>
+                </a:solidFill>
+                <a:latin typeface="Futura Medium" panose="020B0602020204020303" pitchFamily="34" charset="-79"/>
+                <a:cs typeface="Futura Medium" panose="020B0602020204020303" pitchFamily="34" charset="-79"/>
+              </a:rPr>
+              <a:t>binary</a:t>
+            </a:r>
+            <a:r>
+              <a:rPr lang="pl-PL" sz="2000" dirty="0">
+                <a:solidFill>
+                  <a:schemeClr val="bg2">
+                    <a:lumMod val="75000"/>
+                  </a:schemeClr>
+                </a:solidFill>
+                <a:latin typeface="Futura Medium" panose="020B0602020204020303" pitchFamily="34" charset="-79"/>
+                <a:cs typeface="Futura Medium" panose="020B0602020204020303" pitchFamily="34" charset="-79"/>
+              </a:rPr>
+              <a:t>) </a:t>
             </a:r>
             <a:r>
               <a:rPr lang="pl-PL" sz="2000" dirty="0" err="1">
@@ -31256,9 +31636,8 @@
             <a:r>
               <a:rPr lang="pl-PL" sz="1200" dirty="0" err="1">
                 <a:solidFill>
-                  <a:schemeClr val="tx1">
-                    <a:lumMod val="50000"/>
-                    <a:lumOff val="50000"/>
+                  <a:schemeClr val="bg2">
+                    <a:lumMod val="90000"/>
                   </a:schemeClr>
                 </a:solidFill>
                 <a:latin typeface="Futura Medium" panose="020B0602020204020303" pitchFamily="34" charset="-79"/>
@@ -31269,9 +31648,8 @@
             <a:r>
               <a:rPr lang="pl-PL" sz="1200" dirty="0">
                 <a:solidFill>
-                  <a:schemeClr val="tx1">
-                    <a:lumMod val="50000"/>
-                    <a:lumOff val="50000"/>
+                  <a:schemeClr val="bg2">
+                    <a:lumMod val="90000"/>
                   </a:schemeClr>
                 </a:solidFill>
                 <a:latin typeface="Futura Medium" panose="020B0602020204020303" pitchFamily="34" charset="-79"/>
@@ -31282,9 +31660,8 @@
             <a:r>
               <a:rPr lang="pl-PL" sz="1200" dirty="0" err="1">
                 <a:solidFill>
-                  <a:schemeClr val="tx1">
-                    <a:lumMod val="50000"/>
-                    <a:lumOff val="50000"/>
+                  <a:schemeClr val="bg2">
+                    <a:lumMod val="90000"/>
                   </a:schemeClr>
                 </a:solidFill>
                 <a:latin typeface="Futura Medium" panose="020B0602020204020303" pitchFamily="34" charset="-79"/>
@@ -31295,9 +31672,8 @@
             <a:r>
               <a:rPr lang="pl-PL" sz="1200" dirty="0">
                 <a:solidFill>
-                  <a:schemeClr val="tx1">
-                    <a:lumMod val="50000"/>
-                    <a:lumOff val="50000"/>
+                  <a:schemeClr val="bg2">
+                    <a:lumMod val="90000"/>
                   </a:schemeClr>
                 </a:solidFill>
                 <a:latin typeface="Futura Medium" panose="020B0602020204020303" pitchFamily="34" charset="-79"/>
@@ -31308,9 +31684,8 @@
             <a:r>
               <a:rPr lang="pl-PL" sz="1200" dirty="0" err="1">
                 <a:solidFill>
-                  <a:schemeClr val="tx1">
-                    <a:lumMod val="50000"/>
-                    <a:lumOff val="50000"/>
+                  <a:schemeClr val="bg2">
+                    <a:lumMod val="90000"/>
                   </a:schemeClr>
                 </a:solidFill>
                 <a:latin typeface="Futura Medium" panose="020B0602020204020303" pitchFamily="34" charset="-79"/>
@@ -31321,9 +31696,8 @@
             <a:r>
               <a:rPr lang="pl-PL" sz="1200" dirty="0">
                 <a:solidFill>
-                  <a:schemeClr val="tx1">
-                    <a:lumMod val="50000"/>
-                    <a:lumOff val="50000"/>
+                  <a:schemeClr val="bg2">
+                    <a:lumMod val="90000"/>
                   </a:schemeClr>
                 </a:solidFill>
                 <a:latin typeface="Futura Medium" panose="020B0602020204020303" pitchFamily="34" charset="-79"/>
@@ -31334,9 +31708,8 @@
             <a:r>
               <a:rPr lang="pl-PL" sz="1200" dirty="0" err="1">
                 <a:solidFill>
-                  <a:schemeClr val="tx1">
-                    <a:lumMod val="50000"/>
-                    <a:lumOff val="50000"/>
+                  <a:schemeClr val="bg2">
+                    <a:lumMod val="90000"/>
                   </a:schemeClr>
                 </a:solidFill>
                 <a:latin typeface="Futura Medium" panose="020B0602020204020303" pitchFamily="34" charset="-79"/>
@@ -31347,9 +31720,8 @@
             <a:r>
               <a:rPr lang="pl-PL" sz="1200" dirty="0">
                 <a:solidFill>
-                  <a:schemeClr val="tx1">
-                    <a:lumMod val="50000"/>
-                    <a:lumOff val="50000"/>
+                  <a:schemeClr val="bg2">
+                    <a:lumMod val="90000"/>
                   </a:schemeClr>
                 </a:solidFill>
                 <a:latin typeface="Futura Medium" panose="020B0602020204020303" pitchFamily="34" charset="-79"/>
@@ -31360,9 +31732,8 @@
             <a:r>
               <a:rPr lang="pl-PL" sz="1200" dirty="0" err="1">
                 <a:solidFill>
-                  <a:schemeClr val="tx1">
-                    <a:lumMod val="50000"/>
-                    <a:lumOff val="50000"/>
+                  <a:schemeClr val="bg2">
+                    <a:lumMod val="90000"/>
                   </a:schemeClr>
                 </a:solidFill>
                 <a:latin typeface="Futura Medium" panose="020B0602020204020303" pitchFamily="34" charset="-79"/>
@@ -31373,9 +31744,8 @@
             <a:r>
               <a:rPr lang="pl-PL" sz="1200" dirty="0">
                 <a:solidFill>
-                  <a:schemeClr val="tx1">
-                    <a:lumMod val="50000"/>
-                    <a:lumOff val="50000"/>
+                  <a:schemeClr val="bg2">
+                    <a:lumMod val="90000"/>
                   </a:schemeClr>
                 </a:solidFill>
                 <a:latin typeface="Futura Medium" panose="020B0602020204020303" pitchFamily="34" charset="-79"/>
@@ -31386,9 +31756,8 @@
             <a:r>
               <a:rPr lang="pl-PL" sz="1200" dirty="0" err="1">
                 <a:solidFill>
-                  <a:schemeClr val="tx1">
-                    <a:lumMod val="50000"/>
-                    <a:lumOff val="50000"/>
+                  <a:schemeClr val="bg2">
+                    <a:lumMod val="90000"/>
                   </a:schemeClr>
                 </a:solidFill>
                 <a:latin typeface="Futura Medium" panose="020B0602020204020303" pitchFamily="34" charset="-79"/>
@@ -31399,9 +31768,8 @@
             <a:r>
               <a:rPr lang="pl-PL" sz="1200" dirty="0">
                 <a:solidFill>
-                  <a:schemeClr val="tx1">
-                    <a:lumMod val="50000"/>
-                    <a:lumOff val="50000"/>
+                  <a:schemeClr val="bg2">
+                    <a:lumMod val="90000"/>
                   </a:schemeClr>
                 </a:solidFill>
                 <a:latin typeface="Futura Medium" panose="020B0602020204020303" pitchFamily="34" charset="-79"/>
@@ -31412,9 +31780,8 @@
             <a:r>
               <a:rPr lang="pl-PL" sz="1200" dirty="0" err="1">
                 <a:solidFill>
-                  <a:schemeClr val="tx1">
-                    <a:lumMod val="50000"/>
-                    <a:lumOff val="50000"/>
+                  <a:schemeClr val="bg2">
+                    <a:lumMod val="90000"/>
                   </a:schemeClr>
                 </a:solidFill>
                 <a:latin typeface="Futura Medium" panose="020B0602020204020303" pitchFamily="34" charset="-79"/>
@@ -31425,9 +31792,8 @@
             <a:r>
               <a:rPr lang="pl-PL" sz="1200" dirty="0">
                 <a:solidFill>
-                  <a:schemeClr val="tx1">
-                    <a:lumMod val="50000"/>
-                    <a:lumOff val="50000"/>
+                  <a:schemeClr val="bg2">
+                    <a:lumMod val="90000"/>
                   </a:schemeClr>
                 </a:solidFill>
                 <a:latin typeface="Futura Medium" panose="020B0602020204020303" pitchFamily="34" charset="-79"/>
@@ -31438,9 +31804,8 @@
             <a:r>
               <a:rPr lang="pl-PL" sz="1200" dirty="0" err="1">
                 <a:solidFill>
-                  <a:schemeClr val="tx1">
-                    <a:lumMod val="50000"/>
-                    <a:lumOff val="50000"/>
+                  <a:schemeClr val="bg2">
+                    <a:lumMod val="90000"/>
                   </a:schemeClr>
                 </a:solidFill>
                 <a:latin typeface="Futura Medium" panose="020B0602020204020303" pitchFamily="34" charset="-79"/>
@@ -31451,9 +31816,8 @@
             <a:r>
               <a:rPr lang="pl-PL" sz="1200" dirty="0">
                 <a:solidFill>
-                  <a:schemeClr val="tx1">
-                    <a:lumMod val="50000"/>
-                    <a:lumOff val="50000"/>
+                  <a:schemeClr val="bg2">
+                    <a:lumMod val="90000"/>
                   </a:schemeClr>
                 </a:solidFill>
                 <a:latin typeface="Futura Medium" panose="020B0602020204020303" pitchFamily="34" charset="-79"/>
@@ -31464,9 +31828,8 @@
             <a:r>
               <a:rPr lang="pl-PL" sz="1200" dirty="0" err="1">
                 <a:solidFill>
-                  <a:schemeClr val="tx1">
-                    <a:lumMod val="50000"/>
-                    <a:lumOff val="50000"/>
+                  <a:schemeClr val="bg2">
+                    <a:lumMod val="90000"/>
                   </a:schemeClr>
                 </a:solidFill>
                 <a:latin typeface="Futura Medium" panose="020B0602020204020303" pitchFamily="34" charset="-79"/>
@@ -31477,9 +31840,8 @@
             <a:r>
               <a:rPr lang="pl-PL" sz="1200" dirty="0">
                 <a:solidFill>
-                  <a:schemeClr val="tx1">
-                    <a:lumMod val="50000"/>
-                    <a:lumOff val="50000"/>
+                  <a:schemeClr val="bg2">
+                    <a:lumMod val="90000"/>
                   </a:schemeClr>
                 </a:solidFill>
                 <a:latin typeface="Futura Medium" panose="020B0602020204020303" pitchFamily="34" charset="-79"/>
@@ -31490,9 +31852,8 @@
             <a:r>
               <a:rPr lang="pl-PL" sz="1200" dirty="0" err="1">
                 <a:solidFill>
-                  <a:schemeClr val="tx1">
-                    <a:lumMod val="50000"/>
-                    <a:lumOff val="50000"/>
+                  <a:schemeClr val="bg2">
+                    <a:lumMod val="90000"/>
                   </a:schemeClr>
                 </a:solidFill>
                 <a:latin typeface="Futura Medium" panose="020B0602020204020303" pitchFamily="34" charset="-79"/>
@@ -31503,9 +31864,8 @@
             <a:r>
               <a:rPr lang="pl-PL" sz="1200" dirty="0">
                 <a:solidFill>
-                  <a:schemeClr val="tx1">
-                    <a:lumMod val="50000"/>
-                    <a:lumOff val="50000"/>
+                  <a:schemeClr val="bg2">
+                    <a:lumMod val="90000"/>
                   </a:schemeClr>
                 </a:solidFill>
                 <a:latin typeface="Futura Medium" panose="020B0602020204020303" pitchFamily="34" charset="-79"/>
@@ -31516,9 +31876,8 @@
             <a:r>
               <a:rPr lang="pl-PL" sz="1200" dirty="0" err="1">
                 <a:solidFill>
-                  <a:schemeClr val="tx1">
-                    <a:lumMod val="50000"/>
-                    <a:lumOff val="50000"/>
+                  <a:schemeClr val="bg2">
+                    <a:lumMod val="90000"/>
                   </a:schemeClr>
                 </a:solidFill>
                 <a:latin typeface="Futura Medium" panose="020B0602020204020303" pitchFamily="34" charset="-79"/>
@@ -31529,9 +31888,8 @@
             <a:r>
               <a:rPr lang="pl-PL" sz="1200" dirty="0">
                 <a:solidFill>
-                  <a:schemeClr val="tx1">
-                    <a:lumMod val="50000"/>
-                    <a:lumOff val="50000"/>
+                  <a:schemeClr val="bg2">
+                    <a:lumMod val="90000"/>
                   </a:schemeClr>
                 </a:solidFill>
                 <a:latin typeface="Futura Medium" panose="020B0602020204020303" pitchFamily="34" charset="-79"/>
@@ -31542,9 +31900,8 @@
             <a:r>
               <a:rPr lang="pl-PL" sz="1200" dirty="0" err="1">
                 <a:solidFill>
-                  <a:schemeClr val="tx1">
-                    <a:lumMod val="50000"/>
-                    <a:lumOff val="50000"/>
+                  <a:schemeClr val="bg2">
+                    <a:lumMod val="90000"/>
                   </a:schemeClr>
                 </a:solidFill>
                 <a:latin typeface="Futura Medium" panose="020B0602020204020303" pitchFamily="34" charset="-79"/>
@@ -31555,9 +31912,8 @@
             <a:r>
               <a:rPr lang="pl-PL" sz="1200" dirty="0">
                 <a:solidFill>
-                  <a:schemeClr val="tx1">
-                    <a:lumMod val="50000"/>
-                    <a:lumOff val="50000"/>
+                  <a:schemeClr val="bg2">
+                    <a:lumMod val="90000"/>
                   </a:schemeClr>
                 </a:solidFill>
                 <a:latin typeface="Futura Medium" panose="020B0602020204020303" pitchFamily="34" charset="-79"/>
@@ -31568,9 +31924,8 @@
             <a:r>
               <a:rPr lang="pl-PL" sz="1200" dirty="0" err="1">
                 <a:solidFill>
-                  <a:schemeClr val="tx1">
-                    <a:lumMod val="50000"/>
-                    <a:lumOff val="50000"/>
+                  <a:schemeClr val="bg2">
+                    <a:lumMod val="90000"/>
                   </a:schemeClr>
                 </a:solidFill>
                 <a:latin typeface="Futura Medium" panose="020B0602020204020303" pitchFamily="34" charset="-79"/>
@@ -31581,9 +31936,8 @@
             <a:r>
               <a:rPr lang="pl-PL" sz="1200" dirty="0">
                 <a:solidFill>
-                  <a:schemeClr val="tx1">
-                    <a:lumMod val="50000"/>
-                    <a:lumOff val="50000"/>
+                  <a:schemeClr val="bg2">
+                    <a:lumMod val="90000"/>
                   </a:schemeClr>
                 </a:solidFill>
                 <a:latin typeface="Futura Medium" panose="020B0602020204020303" pitchFamily="34" charset="-79"/>
@@ -31594,9 +31948,8 @@
             <a:r>
               <a:rPr lang="pl-PL" sz="1200" dirty="0" err="1">
                 <a:solidFill>
-                  <a:schemeClr val="tx1">
-                    <a:lumMod val="50000"/>
-                    <a:lumOff val="50000"/>
+                  <a:schemeClr val="bg2">
+                    <a:lumMod val="90000"/>
                   </a:schemeClr>
                 </a:solidFill>
                 <a:latin typeface="Futura Medium" panose="020B0602020204020303" pitchFamily="34" charset="-79"/>
@@ -31606,9 +31959,8 @@
             </a:r>
             <a:endParaRPr lang="pl-PL" sz="1200" dirty="0">
               <a:solidFill>
-                <a:schemeClr val="tx1">
-                  <a:lumMod val="50000"/>
-                  <a:lumOff val="50000"/>
+                <a:schemeClr val="bg2">
+                  <a:lumMod val="90000"/>
                 </a:schemeClr>
               </a:solidFill>
               <a:latin typeface="Futura Medium" panose="020B0602020204020303" pitchFamily="34" charset="-79"/>
@@ -32779,9 +33131,8 @@
             <a:r>
               <a:rPr lang="pl-PL" sz="1200" dirty="0" err="1">
                 <a:solidFill>
-                  <a:schemeClr val="tx1">
-                    <a:lumMod val="50000"/>
-                    <a:lumOff val="50000"/>
+                  <a:schemeClr val="bg2">
+                    <a:lumMod val="90000"/>
                   </a:schemeClr>
                 </a:solidFill>
                 <a:latin typeface="Futura Medium" panose="020B0602020204020303" pitchFamily="34" charset="-79"/>
@@ -32792,9 +33143,8 @@
             <a:r>
               <a:rPr lang="pl-PL" sz="1200" dirty="0">
                 <a:solidFill>
-                  <a:schemeClr val="tx1">
-                    <a:lumMod val="50000"/>
-                    <a:lumOff val="50000"/>
+                  <a:schemeClr val="bg2">
+                    <a:lumMod val="90000"/>
                   </a:schemeClr>
                 </a:solidFill>
                 <a:latin typeface="Futura Medium" panose="020B0602020204020303" pitchFamily="34" charset="-79"/>
@@ -32805,9 +33155,8 @@
             <a:r>
               <a:rPr lang="pl-PL" sz="1200" dirty="0" err="1">
                 <a:solidFill>
-                  <a:schemeClr val="tx1">
-                    <a:lumMod val="50000"/>
-                    <a:lumOff val="50000"/>
+                  <a:schemeClr val="bg2">
+                    <a:lumMod val="90000"/>
                   </a:schemeClr>
                 </a:solidFill>
                 <a:latin typeface="Futura Medium" panose="020B0602020204020303" pitchFamily="34" charset="-79"/>
@@ -32818,9 +33167,8 @@
             <a:r>
               <a:rPr lang="pl-PL" sz="1200" dirty="0">
                 <a:solidFill>
-                  <a:schemeClr val="tx1">
-                    <a:lumMod val="50000"/>
-                    <a:lumOff val="50000"/>
+                  <a:schemeClr val="bg2">
+                    <a:lumMod val="90000"/>
                   </a:schemeClr>
                 </a:solidFill>
                 <a:latin typeface="Futura Medium" panose="020B0602020204020303" pitchFamily="34" charset="-79"/>
@@ -32831,9 +33179,8 @@
             <a:r>
               <a:rPr lang="pl-PL" sz="1200" dirty="0" err="1">
                 <a:solidFill>
-                  <a:schemeClr val="tx1">
-                    <a:lumMod val="50000"/>
-                    <a:lumOff val="50000"/>
+                  <a:schemeClr val="bg2">
+                    <a:lumMod val="90000"/>
                   </a:schemeClr>
                 </a:solidFill>
                 <a:latin typeface="Futura Medium" panose="020B0602020204020303" pitchFamily="34" charset="-79"/>
@@ -32844,9 +33191,8 @@
             <a:r>
               <a:rPr lang="pl-PL" sz="1200" dirty="0">
                 <a:solidFill>
-                  <a:schemeClr val="tx1">
-                    <a:lumMod val="50000"/>
-                    <a:lumOff val="50000"/>
+                  <a:schemeClr val="bg2">
+                    <a:lumMod val="90000"/>
                   </a:schemeClr>
                 </a:solidFill>
                 <a:latin typeface="Futura Medium" panose="020B0602020204020303" pitchFamily="34" charset="-79"/>
@@ -32857,9 +33203,8 @@
             <a:r>
               <a:rPr lang="pl-PL" sz="1200" dirty="0" err="1">
                 <a:solidFill>
-                  <a:schemeClr val="tx1">
-                    <a:lumMod val="50000"/>
-                    <a:lumOff val="50000"/>
+                  <a:schemeClr val="bg2">
+                    <a:lumMod val="90000"/>
                   </a:schemeClr>
                 </a:solidFill>
                 <a:latin typeface="Futura Medium" panose="020B0602020204020303" pitchFamily="34" charset="-79"/>
@@ -32870,9 +33215,8 @@
             <a:r>
               <a:rPr lang="pl-PL" sz="1200" dirty="0">
                 <a:solidFill>
-                  <a:schemeClr val="tx1">
-                    <a:lumMod val="50000"/>
-                    <a:lumOff val="50000"/>
+                  <a:schemeClr val="bg2">
+                    <a:lumMod val="90000"/>
                   </a:schemeClr>
                 </a:solidFill>
                 <a:latin typeface="Futura Medium" panose="020B0602020204020303" pitchFamily="34" charset="-79"/>
@@ -32883,9 +33227,8 @@
             <a:r>
               <a:rPr lang="pl-PL" sz="1200" dirty="0" err="1">
                 <a:solidFill>
-                  <a:schemeClr val="tx1">
-                    <a:lumMod val="50000"/>
-                    <a:lumOff val="50000"/>
+                  <a:schemeClr val="bg2">
+                    <a:lumMod val="90000"/>
                   </a:schemeClr>
                 </a:solidFill>
                 <a:latin typeface="Futura Medium" panose="020B0602020204020303" pitchFamily="34" charset="-79"/>
@@ -32896,9 +33239,8 @@
             <a:r>
               <a:rPr lang="pl-PL" sz="1200" dirty="0">
                 <a:solidFill>
-                  <a:schemeClr val="tx1">
-                    <a:lumMod val="50000"/>
-                    <a:lumOff val="50000"/>
+                  <a:schemeClr val="bg2">
+                    <a:lumMod val="90000"/>
                   </a:schemeClr>
                 </a:solidFill>
                 <a:latin typeface="Futura Medium" panose="020B0602020204020303" pitchFamily="34" charset="-79"/>
@@ -32909,9 +33251,8 @@
             <a:r>
               <a:rPr lang="pl-PL" sz="1200" dirty="0" err="1">
                 <a:solidFill>
-                  <a:schemeClr val="tx1">
-                    <a:lumMod val="50000"/>
-                    <a:lumOff val="50000"/>
+                  <a:schemeClr val="bg2">
+                    <a:lumMod val="90000"/>
                   </a:schemeClr>
                 </a:solidFill>
                 <a:latin typeface="Futura Medium" panose="020B0602020204020303" pitchFamily="34" charset="-79"/>
@@ -32922,9 +33263,8 @@
             <a:r>
               <a:rPr lang="pl-PL" sz="1200" dirty="0">
                 <a:solidFill>
-                  <a:schemeClr val="tx1">
-                    <a:lumMod val="50000"/>
-                    <a:lumOff val="50000"/>
+                  <a:schemeClr val="bg2">
+                    <a:lumMod val="90000"/>
                   </a:schemeClr>
                 </a:solidFill>
                 <a:latin typeface="Futura Medium" panose="020B0602020204020303" pitchFamily="34" charset="-79"/>
@@ -32935,9 +33275,8 @@
             <a:r>
               <a:rPr lang="pl-PL" sz="1200" dirty="0" err="1">
                 <a:solidFill>
-                  <a:schemeClr val="tx1">
-                    <a:lumMod val="50000"/>
-                    <a:lumOff val="50000"/>
+                  <a:schemeClr val="bg2">
+                    <a:lumMod val="90000"/>
                   </a:schemeClr>
                 </a:solidFill>
                 <a:latin typeface="Futura Medium" panose="020B0602020204020303" pitchFamily="34" charset="-79"/>
@@ -32948,9 +33287,8 @@
             <a:r>
               <a:rPr lang="pl-PL" sz="1200" dirty="0">
                 <a:solidFill>
-                  <a:schemeClr val="tx1">
-                    <a:lumMod val="50000"/>
-                    <a:lumOff val="50000"/>
+                  <a:schemeClr val="bg2">
+                    <a:lumMod val="90000"/>
                   </a:schemeClr>
                 </a:solidFill>
                 <a:latin typeface="Futura Medium" panose="020B0602020204020303" pitchFamily="34" charset="-79"/>
@@ -32961,9 +33299,8 @@
             <a:r>
               <a:rPr lang="pl-PL" sz="1200" dirty="0" err="1">
                 <a:solidFill>
-                  <a:schemeClr val="tx1">
-                    <a:lumMod val="50000"/>
-                    <a:lumOff val="50000"/>
+                  <a:schemeClr val="bg2">
+                    <a:lumMod val="90000"/>
                   </a:schemeClr>
                 </a:solidFill>
                 <a:latin typeface="Futura Medium" panose="020B0602020204020303" pitchFamily="34" charset="-79"/>
@@ -32974,9 +33311,8 @@
             <a:r>
               <a:rPr lang="pl-PL" sz="1200" dirty="0">
                 <a:solidFill>
-                  <a:schemeClr val="tx1">
-                    <a:lumMod val="50000"/>
-                    <a:lumOff val="50000"/>
+                  <a:schemeClr val="bg2">
+                    <a:lumMod val="90000"/>
                   </a:schemeClr>
                 </a:solidFill>
                 <a:latin typeface="Futura Medium" panose="020B0602020204020303" pitchFamily="34" charset="-79"/>
@@ -32987,9 +33323,8 @@
             <a:r>
               <a:rPr lang="pl-PL" sz="1200" dirty="0" err="1">
                 <a:solidFill>
-                  <a:schemeClr val="tx1">
-                    <a:lumMod val="50000"/>
-                    <a:lumOff val="50000"/>
+                  <a:schemeClr val="bg2">
+                    <a:lumMod val="90000"/>
                   </a:schemeClr>
                 </a:solidFill>
                 <a:latin typeface="Futura Medium" panose="020B0602020204020303" pitchFamily="34" charset="-79"/>
@@ -33000,9 +33335,8 @@
             <a:r>
               <a:rPr lang="pl-PL" sz="1200" dirty="0">
                 <a:solidFill>
-                  <a:schemeClr val="tx1">
-                    <a:lumMod val="50000"/>
-                    <a:lumOff val="50000"/>
+                  <a:schemeClr val="bg2">
+                    <a:lumMod val="90000"/>
                   </a:schemeClr>
                 </a:solidFill>
                 <a:latin typeface="Futura Medium" panose="020B0602020204020303" pitchFamily="34" charset="-79"/>
@@ -33013,9 +33347,8 @@
             <a:r>
               <a:rPr lang="pl-PL" sz="1200" dirty="0" err="1">
                 <a:solidFill>
-                  <a:schemeClr val="tx1">
-                    <a:lumMod val="50000"/>
-                    <a:lumOff val="50000"/>
+                  <a:schemeClr val="bg2">
+                    <a:lumMod val="90000"/>
                   </a:schemeClr>
                 </a:solidFill>
                 <a:latin typeface="Futura Medium" panose="020B0602020204020303" pitchFamily="34" charset="-79"/>
@@ -33026,9 +33359,8 @@
             <a:r>
               <a:rPr lang="pl-PL" sz="1200" dirty="0">
                 <a:solidFill>
-                  <a:schemeClr val="tx1">
-                    <a:lumMod val="50000"/>
-                    <a:lumOff val="50000"/>
+                  <a:schemeClr val="bg2">
+                    <a:lumMod val="90000"/>
                   </a:schemeClr>
                 </a:solidFill>
                 <a:latin typeface="Futura Medium" panose="020B0602020204020303" pitchFamily="34" charset="-79"/>
@@ -33039,9 +33371,8 @@
             <a:r>
               <a:rPr lang="pl-PL" sz="1200" dirty="0" err="1">
                 <a:solidFill>
-                  <a:schemeClr val="tx1">
-                    <a:lumMod val="50000"/>
-                    <a:lumOff val="50000"/>
+                  <a:schemeClr val="bg2">
+                    <a:lumMod val="90000"/>
                   </a:schemeClr>
                 </a:solidFill>
                 <a:latin typeface="Futura Medium" panose="020B0602020204020303" pitchFamily="34" charset="-79"/>
@@ -33052,9 +33383,8 @@
             <a:r>
               <a:rPr lang="pl-PL" sz="1200" dirty="0">
                 <a:solidFill>
-                  <a:schemeClr val="tx1">
-                    <a:lumMod val="50000"/>
-                    <a:lumOff val="50000"/>
+                  <a:schemeClr val="bg2">
+                    <a:lumMod val="90000"/>
                   </a:schemeClr>
                 </a:solidFill>
                 <a:latin typeface="Futura Medium" panose="020B0602020204020303" pitchFamily="34" charset="-79"/>
@@ -33065,9 +33395,8 @@
             <a:r>
               <a:rPr lang="pl-PL" sz="1200" dirty="0" err="1">
                 <a:solidFill>
-                  <a:schemeClr val="tx1">
-                    <a:lumMod val="50000"/>
-                    <a:lumOff val="50000"/>
+                  <a:schemeClr val="bg2">
+                    <a:lumMod val="90000"/>
                   </a:schemeClr>
                 </a:solidFill>
                 <a:latin typeface="Futura Medium" panose="020B0602020204020303" pitchFamily="34" charset="-79"/>
@@ -33078,9 +33407,8 @@
             <a:r>
               <a:rPr lang="pl-PL" sz="1200" dirty="0">
                 <a:solidFill>
-                  <a:schemeClr val="tx1">
-                    <a:lumMod val="50000"/>
-                    <a:lumOff val="50000"/>
+                  <a:schemeClr val="bg2">
+                    <a:lumMod val="90000"/>
                   </a:schemeClr>
                 </a:solidFill>
                 <a:latin typeface="Futura Medium" panose="020B0602020204020303" pitchFamily="34" charset="-79"/>
@@ -33091,9 +33419,8 @@
             <a:r>
               <a:rPr lang="pl-PL" sz="1200" dirty="0" err="1">
                 <a:solidFill>
-                  <a:schemeClr val="tx1">
-                    <a:lumMod val="50000"/>
-                    <a:lumOff val="50000"/>
+                  <a:schemeClr val="bg2">
+                    <a:lumMod val="90000"/>
                   </a:schemeClr>
                 </a:solidFill>
                 <a:latin typeface="Futura Medium" panose="020B0602020204020303" pitchFamily="34" charset="-79"/>
@@ -33104,9 +33431,8 @@
             <a:r>
               <a:rPr lang="pl-PL" sz="1200" dirty="0">
                 <a:solidFill>
-                  <a:schemeClr val="tx1">
-                    <a:lumMod val="50000"/>
-                    <a:lumOff val="50000"/>
+                  <a:schemeClr val="bg2">
+                    <a:lumMod val="90000"/>
                   </a:schemeClr>
                 </a:solidFill>
                 <a:latin typeface="Futura Medium" panose="020B0602020204020303" pitchFamily="34" charset="-79"/>
@@ -33117,9 +33443,8 @@
             <a:r>
               <a:rPr lang="pl-PL" sz="1200" dirty="0" err="1">
                 <a:solidFill>
-                  <a:schemeClr val="tx1">
-                    <a:lumMod val="50000"/>
-                    <a:lumOff val="50000"/>
+                  <a:schemeClr val="bg2">
+                    <a:lumMod val="90000"/>
                   </a:schemeClr>
                 </a:solidFill>
                 <a:latin typeface="Futura Medium" panose="020B0602020204020303" pitchFamily="34" charset="-79"/>
@@ -33130,9 +33455,8 @@
             <a:r>
               <a:rPr lang="pl-PL" sz="1200" dirty="0">
                 <a:solidFill>
-                  <a:schemeClr val="tx1">
-                    <a:lumMod val="50000"/>
-                    <a:lumOff val="50000"/>
+                  <a:schemeClr val="bg2">
+                    <a:lumMod val="90000"/>
                   </a:schemeClr>
                 </a:solidFill>
                 <a:latin typeface="Futura Medium" panose="020B0602020204020303" pitchFamily="34" charset="-79"/>
@@ -33143,9 +33467,8 @@
             <a:r>
               <a:rPr lang="pl-PL" sz="1200" dirty="0" err="1">
                 <a:solidFill>
-                  <a:schemeClr val="tx1">
-                    <a:lumMod val="50000"/>
-                    <a:lumOff val="50000"/>
+                  <a:schemeClr val="bg2">
+                    <a:lumMod val="90000"/>
                   </a:schemeClr>
                 </a:solidFill>
                 <a:latin typeface="Futura Medium" panose="020B0602020204020303" pitchFamily="34" charset="-79"/>
@@ -33155,9 +33478,8 @@
             </a:r>
             <a:endParaRPr lang="pl-PL" sz="1200" dirty="0">
               <a:solidFill>
-                <a:schemeClr val="tx1">
-                  <a:lumMod val="50000"/>
-                  <a:lumOff val="50000"/>
+                <a:schemeClr val="bg2">
+                  <a:lumMod val="90000"/>
                 </a:schemeClr>
               </a:solidFill>
               <a:latin typeface="Futura Medium" panose="020B0602020204020303" pitchFamily="34" charset="-79"/>
@@ -33201,9 +33523,8 @@
             <a:r>
               <a:rPr lang="pl-PL" sz="1200" dirty="0" err="1">
                 <a:solidFill>
-                  <a:schemeClr val="tx1">
-                    <a:lumMod val="50000"/>
-                    <a:lumOff val="50000"/>
+                  <a:schemeClr val="bg2">
+                    <a:lumMod val="90000"/>
                   </a:schemeClr>
                 </a:solidFill>
                 <a:latin typeface="Futura Medium" panose="020B0602020204020303" pitchFamily="34" charset="-79"/>
@@ -33214,9 +33535,8 @@
             <a:r>
               <a:rPr lang="pl-PL" sz="1200" dirty="0">
                 <a:solidFill>
-                  <a:schemeClr val="tx1">
-                    <a:lumMod val="50000"/>
-                    <a:lumOff val="50000"/>
+                  <a:schemeClr val="bg2">
+                    <a:lumMod val="90000"/>
                   </a:schemeClr>
                 </a:solidFill>
                 <a:latin typeface="Futura Medium" panose="020B0602020204020303" pitchFamily="34" charset="-79"/>
@@ -33227,9 +33547,8 @@
             <a:r>
               <a:rPr lang="pl-PL" sz="1200" dirty="0" err="1">
                 <a:solidFill>
-                  <a:schemeClr val="tx1">
-                    <a:lumMod val="50000"/>
-                    <a:lumOff val="50000"/>
+                  <a:schemeClr val="bg2">
+                    <a:lumMod val="90000"/>
                   </a:schemeClr>
                 </a:solidFill>
                 <a:latin typeface="Futura Medium" panose="020B0602020204020303" pitchFamily="34" charset="-79"/>
@@ -33240,9 +33559,8 @@
             <a:r>
               <a:rPr lang="pl-PL" sz="1200" dirty="0">
                 <a:solidFill>
-                  <a:schemeClr val="tx1">
-                    <a:lumMod val="50000"/>
-                    <a:lumOff val="50000"/>
+                  <a:schemeClr val="bg2">
+                    <a:lumMod val="90000"/>
                   </a:schemeClr>
                 </a:solidFill>
                 <a:latin typeface="Futura Medium" panose="020B0602020204020303" pitchFamily="34" charset="-79"/>
@@ -33253,9 +33571,8 @@
             <a:r>
               <a:rPr lang="pl-PL" sz="1200" dirty="0" err="1">
                 <a:solidFill>
-                  <a:schemeClr val="tx1">
-                    <a:lumMod val="50000"/>
-                    <a:lumOff val="50000"/>
+                  <a:schemeClr val="bg2">
+                    <a:lumMod val="90000"/>
                   </a:schemeClr>
                 </a:solidFill>
                 <a:latin typeface="Futura Medium" panose="020B0602020204020303" pitchFamily="34" charset="-79"/>
@@ -33266,9 +33583,8 @@
             <a:r>
               <a:rPr lang="pl-PL" sz="1200" dirty="0">
                 <a:solidFill>
-                  <a:schemeClr val="tx1">
-                    <a:lumMod val="50000"/>
-                    <a:lumOff val="50000"/>
+                  <a:schemeClr val="bg2">
+                    <a:lumMod val="90000"/>
                   </a:schemeClr>
                 </a:solidFill>
                 <a:latin typeface="Futura Medium" panose="020B0602020204020303" pitchFamily="34" charset="-79"/>
@@ -33279,9 +33595,8 @@
             <a:r>
               <a:rPr lang="pl-PL" sz="1200" dirty="0" err="1">
                 <a:solidFill>
-                  <a:schemeClr val="tx1">
-                    <a:lumMod val="50000"/>
-                    <a:lumOff val="50000"/>
+                  <a:schemeClr val="bg2">
+                    <a:lumMod val="90000"/>
                   </a:schemeClr>
                 </a:solidFill>
                 <a:latin typeface="Futura Medium" panose="020B0602020204020303" pitchFamily="34" charset="-79"/>
@@ -33292,9 +33607,8 @@
             <a:r>
               <a:rPr lang="pl-PL" sz="1200" dirty="0">
                 <a:solidFill>
-                  <a:schemeClr val="tx1">
-                    <a:lumMod val="50000"/>
-                    <a:lumOff val="50000"/>
+                  <a:schemeClr val="bg2">
+                    <a:lumMod val="90000"/>
                   </a:schemeClr>
                 </a:solidFill>
                 <a:latin typeface="Futura Medium" panose="020B0602020204020303" pitchFamily="34" charset="-79"/>
@@ -33305,9 +33619,8 @@
             <a:r>
               <a:rPr lang="pl-PL" sz="1200" dirty="0" err="1">
                 <a:solidFill>
-                  <a:schemeClr val="tx1">
-                    <a:lumMod val="50000"/>
-                    <a:lumOff val="50000"/>
+                  <a:schemeClr val="bg2">
+                    <a:lumMod val="90000"/>
                   </a:schemeClr>
                 </a:solidFill>
                 <a:latin typeface="Futura Medium" panose="020B0602020204020303" pitchFamily="34" charset="-79"/>
@@ -33318,9 +33631,8 @@
             <a:r>
               <a:rPr lang="pl-PL" sz="1200" dirty="0">
                 <a:solidFill>
-                  <a:schemeClr val="tx1">
-                    <a:lumMod val="50000"/>
-                    <a:lumOff val="50000"/>
+                  <a:schemeClr val="bg2">
+                    <a:lumMod val="90000"/>
                   </a:schemeClr>
                 </a:solidFill>
                 <a:latin typeface="Futura Medium" panose="020B0602020204020303" pitchFamily="34" charset="-79"/>
@@ -33331,9 +33643,8 @@
             <a:r>
               <a:rPr lang="pl-PL" sz="1200" dirty="0" err="1">
                 <a:solidFill>
-                  <a:schemeClr val="tx1">
-                    <a:lumMod val="50000"/>
-                    <a:lumOff val="50000"/>
+                  <a:schemeClr val="bg2">
+                    <a:lumMod val="90000"/>
                   </a:schemeClr>
                 </a:solidFill>
                 <a:latin typeface="Futura Medium" panose="020B0602020204020303" pitchFamily="34" charset="-79"/>
@@ -33344,9 +33655,8 @@
             <a:r>
               <a:rPr lang="pl-PL" sz="1200" dirty="0">
                 <a:solidFill>
-                  <a:schemeClr val="tx1">
-                    <a:lumMod val="50000"/>
-                    <a:lumOff val="50000"/>
+                  <a:schemeClr val="bg2">
+                    <a:lumMod val="90000"/>
                   </a:schemeClr>
                 </a:solidFill>
                 <a:latin typeface="Futura Medium" panose="020B0602020204020303" pitchFamily="34" charset="-79"/>
@@ -33357,9 +33667,8 @@
             <a:r>
               <a:rPr lang="pl-PL" sz="1200" dirty="0" err="1">
                 <a:solidFill>
-                  <a:schemeClr val="tx1">
-                    <a:lumMod val="50000"/>
-                    <a:lumOff val="50000"/>
+                  <a:schemeClr val="bg2">
+                    <a:lumMod val="90000"/>
                   </a:schemeClr>
                 </a:solidFill>
                 <a:latin typeface="Futura Medium" panose="020B0602020204020303" pitchFamily="34" charset="-79"/>
@@ -33370,9 +33679,8 @@
             <a:r>
               <a:rPr lang="pl-PL" sz="1200" dirty="0">
                 <a:solidFill>
-                  <a:schemeClr val="tx1">
-                    <a:lumMod val="50000"/>
-                    <a:lumOff val="50000"/>
+                  <a:schemeClr val="bg2">
+                    <a:lumMod val="90000"/>
                   </a:schemeClr>
                 </a:solidFill>
                 <a:latin typeface="Futura Medium" panose="020B0602020204020303" pitchFamily="34" charset="-79"/>
@@ -33383,9 +33691,8 @@
             <a:r>
               <a:rPr lang="pl-PL" sz="1200" dirty="0" err="1">
                 <a:solidFill>
-                  <a:schemeClr val="tx1">
-                    <a:lumMod val="50000"/>
-                    <a:lumOff val="50000"/>
+                  <a:schemeClr val="bg2">
+                    <a:lumMod val="90000"/>
                   </a:schemeClr>
                 </a:solidFill>
                 <a:latin typeface="Futura Medium" panose="020B0602020204020303" pitchFamily="34" charset="-79"/>
@@ -33396,9 +33703,8 @@
             <a:r>
               <a:rPr lang="pl-PL" sz="1200" dirty="0">
                 <a:solidFill>
-                  <a:schemeClr val="tx1">
-                    <a:lumMod val="50000"/>
-                    <a:lumOff val="50000"/>
+                  <a:schemeClr val="bg2">
+                    <a:lumMod val="90000"/>
                   </a:schemeClr>
                 </a:solidFill>
                 <a:latin typeface="Futura Medium" panose="020B0602020204020303" pitchFamily="34" charset="-79"/>
@@ -33409,9 +33715,8 @@
             <a:r>
               <a:rPr lang="pl-PL" sz="1200" dirty="0" err="1">
                 <a:solidFill>
-                  <a:schemeClr val="tx1">
-                    <a:lumMod val="50000"/>
-                    <a:lumOff val="50000"/>
+                  <a:schemeClr val="bg2">
+                    <a:lumMod val="90000"/>
                   </a:schemeClr>
                 </a:solidFill>
                 <a:latin typeface="Futura Medium" panose="020B0602020204020303" pitchFamily="34" charset="-79"/>
@@ -33422,9 +33727,8 @@
             <a:r>
               <a:rPr lang="pl-PL" sz="1200" dirty="0">
                 <a:solidFill>
-                  <a:schemeClr val="tx1">
-                    <a:lumMod val="50000"/>
-                    <a:lumOff val="50000"/>
+                  <a:schemeClr val="bg2">
+                    <a:lumMod val="90000"/>
                   </a:schemeClr>
                 </a:solidFill>
                 <a:latin typeface="Futura Medium" panose="020B0602020204020303" pitchFamily="34" charset="-79"/>
@@ -33435,9 +33739,8 @@
             <a:r>
               <a:rPr lang="pl-PL" sz="1200" dirty="0" err="1">
                 <a:solidFill>
-                  <a:schemeClr val="tx1">
-                    <a:lumMod val="50000"/>
-                    <a:lumOff val="50000"/>
+                  <a:schemeClr val="bg2">
+                    <a:lumMod val="90000"/>
                   </a:schemeClr>
                 </a:solidFill>
                 <a:latin typeface="Futura Medium" panose="020B0602020204020303" pitchFamily="34" charset="-79"/>
@@ -33448,9 +33751,8 @@
             <a:r>
               <a:rPr lang="pl-PL" sz="1200" dirty="0">
                 <a:solidFill>
-                  <a:schemeClr val="tx1">
-                    <a:lumMod val="50000"/>
-                    <a:lumOff val="50000"/>
+                  <a:schemeClr val="bg2">
+                    <a:lumMod val="90000"/>
                   </a:schemeClr>
                 </a:solidFill>
                 <a:latin typeface="Futura Medium" panose="020B0602020204020303" pitchFamily="34" charset="-79"/>
@@ -33461,9 +33763,8 @@
             <a:r>
               <a:rPr lang="pl-PL" sz="1200" dirty="0" err="1">
                 <a:solidFill>
-                  <a:schemeClr val="tx1">
-                    <a:lumMod val="50000"/>
-                    <a:lumOff val="50000"/>
+                  <a:schemeClr val="bg2">
+                    <a:lumMod val="90000"/>
                   </a:schemeClr>
                 </a:solidFill>
                 <a:latin typeface="Futura Medium" panose="020B0602020204020303" pitchFamily="34" charset="-79"/>
@@ -33474,9 +33775,8 @@
             <a:r>
               <a:rPr lang="pl-PL" sz="1200" dirty="0">
                 <a:solidFill>
-                  <a:schemeClr val="tx1">
-                    <a:lumMod val="50000"/>
-                    <a:lumOff val="50000"/>
+                  <a:schemeClr val="bg2">
+                    <a:lumMod val="90000"/>
                   </a:schemeClr>
                 </a:solidFill>
                 <a:latin typeface="Futura Medium" panose="020B0602020204020303" pitchFamily="34" charset="-79"/>
@@ -33487,9 +33787,8 @@
             <a:r>
               <a:rPr lang="pl-PL" sz="1200" dirty="0" err="1">
                 <a:solidFill>
-                  <a:schemeClr val="tx1">
-                    <a:lumMod val="50000"/>
-                    <a:lumOff val="50000"/>
+                  <a:schemeClr val="bg2">
+                    <a:lumMod val="90000"/>
                   </a:schemeClr>
                 </a:solidFill>
                 <a:latin typeface="Futura Medium" panose="020B0602020204020303" pitchFamily="34" charset="-79"/>
@@ -33500,9 +33799,8 @@
             <a:r>
               <a:rPr lang="pl-PL" sz="1200" dirty="0">
                 <a:solidFill>
-                  <a:schemeClr val="tx1">
-                    <a:lumMod val="50000"/>
-                    <a:lumOff val="50000"/>
+                  <a:schemeClr val="bg2">
+                    <a:lumMod val="90000"/>
                   </a:schemeClr>
                 </a:solidFill>
                 <a:latin typeface="Futura Medium" panose="020B0602020204020303" pitchFamily="34" charset="-79"/>
@@ -33513,9 +33811,8 @@
             <a:r>
               <a:rPr lang="pl-PL" sz="1200" dirty="0" err="1">
                 <a:solidFill>
-                  <a:schemeClr val="tx1">
-                    <a:lumMod val="50000"/>
-                    <a:lumOff val="50000"/>
+                  <a:schemeClr val="bg2">
+                    <a:lumMod val="90000"/>
                   </a:schemeClr>
                 </a:solidFill>
                 <a:latin typeface="Futura Medium" panose="020B0602020204020303" pitchFamily="34" charset="-79"/>
@@ -33526,9 +33823,8 @@
             <a:r>
               <a:rPr lang="pl-PL" sz="1200" dirty="0">
                 <a:solidFill>
-                  <a:schemeClr val="tx1">
-                    <a:lumMod val="50000"/>
-                    <a:lumOff val="50000"/>
+                  <a:schemeClr val="bg2">
+                    <a:lumMod val="90000"/>
                   </a:schemeClr>
                 </a:solidFill>
                 <a:latin typeface="Futura Medium" panose="020B0602020204020303" pitchFamily="34" charset="-79"/>
@@ -33539,9 +33835,8 @@
             <a:r>
               <a:rPr lang="pl-PL" sz="1200" dirty="0" err="1">
                 <a:solidFill>
-                  <a:schemeClr val="tx1">
-                    <a:lumMod val="50000"/>
-                    <a:lumOff val="50000"/>
+                  <a:schemeClr val="bg2">
+                    <a:lumMod val="90000"/>
                   </a:schemeClr>
                 </a:solidFill>
                 <a:latin typeface="Futura Medium" panose="020B0602020204020303" pitchFamily="34" charset="-79"/>
@@ -33552,9 +33847,8 @@
             <a:r>
               <a:rPr lang="pl-PL" sz="1200" dirty="0">
                 <a:solidFill>
-                  <a:schemeClr val="tx1">
-                    <a:lumMod val="50000"/>
-                    <a:lumOff val="50000"/>
+                  <a:schemeClr val="bg2">
+                    <a:lumMod val="90000"/>
                   </a:schemeClr>
                 </a:solidFill>
                 <a:latin typeface="Futura Medium" panose="020B0602020204020303" pitchFamily="34" charset="-79"/>
@@ -33565,9 +33859,8 @@
             <a:r>
               <a:rPr lang="pl-PL" sz="1200" dirty="0" err="1">
                 <a:solidFill>
-                  <a:schemeClr val="tx1">
-                    <a:lumMod val="50000"/>
-                    <a:lumOff val="50000"/>
+                  <a:schemeClr val="bg2">
+                    <a:lumMod val="90000"/>
                   </a:schemeClr>
                 </a:solidFill>
                 <a:latin typeface="Futura Medium" panose="020B0602020204020303" pitchFamily="34" charset="-79"/>
@@ -33578,9 +33871,8 @@
             <a:r>
               <a:rPr lang="pl-PL" sz="1200" dirty="0">
                 <a:solidFill>
-                  <a:schemeClr val="tx1">
-                    <a:lumMod val="50000"/>
-                    <a:lumOff val="50000"/>
+                  <a:schemeClr val="bg2">
+                    <a:lumMod val="90000"/>
                   </a:schemeClr>
                 </a:solidFill>
                 <a:latin typeface="Futura Medium" panose="020B0602020204020303" pitchFamily="34" charset="-79"/>
@@ -33591,9 +33883,8 @@
             <a:r>
               <a:rPr lang="pl-PL" sz="1200" dirty="0" err="1">
                 <a:solidFill>
-                  <a:schemeClr val="tx1">
-                    <a:lumMod val="50000"/>
-                    <a:lumOff val="50000"/>
+                  <a:schemeClr val="bg2">
+                    <a:lumMod val="90000"/>
                   </a:schemeClr>
                 </a:solidFill>
                 <a:latin typeface="Futura Medium" panose="020B0602020204020303" pitchFamily="34" charset="-79"/>
@@ -33603,9 +33894,8 @@
             </a:r>
             <a:endParaRPr lang="pl-PL" sz="1200" dirty="0">
               <a:solidFill>
-                <a:schemeClr val="tx1">
-                  <a:lumMod val="50000"/>
-                  <a:lumOff val="50000"/>
+                <a:schemeClr val="bg2">
+                  <a:lumMod val="90000"/>
                 </a:schemeClr>
               </a:solidFill>
               <a:latin typeface="Futura Medium" panose="020B0602020204020303" pitchFamily="34" charset="-79"/>

</xml_diff>

<commit_message>
Deleted not refactored notebooks, copied part of their content to Research (small part).
</commit_message>
<xml_diff>
--- a/presentations/business/pnos_business_ppt.pptx
+++ b/presentations/business/pnos_business_ppt.pptx
@@ -5,7 +5,7 @@
     <p:sldMasterId id="2147483648" r:id="rId1"/>
   </p:sldMasterIdLst>
   <p:notesMasterIdLst>
-    <p:notesMasterId r:id="rId33"/>
+    <p:notesMasterId r:id="rId34"/>
   </p:notesMasterIdLst>
   <p:sldIdLst>
     <p:sldId id="256" r:id="rId2"/>
@@ -31,14 +31,15 @@
     <p:sldId id="276" r:id="rId22"/>
     <p:sldId id="277" r:id="rId23"/>
     <p:sldId id="279" r:id="rId24"/>
-    <p:sldId id="287" r:id="rId25"/>
-    <p:sldId id="280" r:id="rId26"/>
-    <p:sldId id="281" r:id="rId27"/>
-    <p:sldId id="284" r:id="rId28"/>
-    <p:sldId id="270" r:id="rId29"/>
-    <p:sldId id="263" r:id="rId30"/>
-    <p:sldId id="271" r:id="rId31"/>
-    <p:sldId id="264" r:id="rId32"/>
+    <p:sldId id="301" r:id="rId25"/>
+    <p:sldId id="302" r:id="rId26"/>
+    <p:sldId id="280" r:id="rId27"/>
+    <p:sldId id="281" r:id="rId28"/>
+    <p:sldId id="284" r:id="rId29"/>
+    <p:sldId id="270" r:id="rId30"/>
+    <p:sldId id="263" r:id="rId31"/>
+    <p:sldId id="271" r:id="rId32"/>
+    <p:sldId id="264" r:id="rId33"/>
   </p:sldIdLst>
   <p:sldSz cx="12192000" cy="6858000"/>
   <p:notesSz cx="6858000" cy="9144000"/>
@@ -6832,7 +6833,7 @@
           <a:p>
             <a:fld id="{B9A9EE70-06A6-5645-802D-4F9862C567B5}" type="datetimeFigureOut">
               <a:rPr lang="pl-PL" smtClean="0"/>
-              <a:t>25.11.2019</a:t>
+              <a:t>26.11.2019</a:t>
             </a:fld>
             <a:endParaRPr lang="pl-PL"/>
           </a:p>
@@ -7510,7 +7511,7 @@
     </p:spTree>
     <p:extLst>
       <p:ext uri="{BB962C8B-B14F-4D97-AF65-F5344CB8AC3E}">
-        <p14:creationId xmlns:p14="http://schemas.microsoft.com/office/powerpoint/2010/main" val="3611794371"/>
+        <p14:creationId xmlns:p14="http://schemas.microsoft.com/office/powerpoint/2010/main" val="1729564653"/>
       </p:ext>
     </p:extLst>
   </p:cSld>
@@ -7585,7 +7586,7 @@
           <a:p>
             <a:fld id="{34EB93A8-DA20-AF40-AAB7-97274E8C4E9F}" type="slidenum">
               <a:rPr lang="pl-PL" smtClean="0"/>
-              <a:t>25</a:t>
+              <a:t>26</a:t>
             </a:fld>
             <a:endParaRPr lang="pl-PL"/>
           </a:p>
@@ -7669,7 +7670,7 @@
           <a:p>
             <a:fld id="{34EB93A8-DA20-AF40-AAB7-97274E8C4E9F}" type="slidenum">
               <a:rPr lang="pl-PL" smtClean="0"/>
-              <a:t>26</a:t>
+              <a:t>27</a:t>
             </a:fld>
             <a:endParaRPr lang="pl-PL"/>
           </a:p>
@@ -7753,7 +7754,7 @@
           <a:p>
             <a:fld id="{34EB93A8-DA20-AF40-AAB7-97274E8C4E9F}" type="slidenum">
               <a:rPr lang="pl-PL" smtClean="0"/>
-              <a:t>27</a:t>
+              <a:t>28</a:t>
             </a:fld>
             <a:endParaRPr lang="pl-PL"/>
           </a:p>
@@ -7837,7 +7838,7 @@
           <a:p>
             <a:fld id="{34EB93A8-DA20-AF40-AAB7-97274E8C4E9F}" type="slidenum">
               <a:rPr lang="pl-PL" smtClean="0"/>
-              <a:t>29</a:t>
+              <a:t>30</a:t>
             </a:fld>
             <a:endParaRPr lang="pl-PL"/>
           </a:p>
@@ -8005,7 +8006,7 @@
           <a:p>
             <a:fld id="{BDB90D4E-B4B4-AA4D-8C3E-EED2DA1EB551}" type="datetimeFigureOut">
               <a:rPr lang="pl-PL" smtClean="0"/>
-              <a:t>25.11.2019</a:t>
+              <a:t>26.11.2019</a:t>
             </a:fld>
             <a:endParaRPr lang="pl-PL"/>
           </a:p>
@@ -8205,7 +8206,7 @@
           <a:p>
             <a:fld id="{BDB90D4E-B4B4-AA4D-8C3E-EED2DA1EB551}" type="datetimeFigureOut">
               <a:rPr lang="pl-PL" smtClean="0"/>
-              <a:t>25.11.2019</a:t>
+              <a:t>26.11.2019</a:t>
             </a:fld>
             <a:endParaRPr lang="pl-PL"/>
           </a:p>
@@ -8415,7 +8416,7 @@
           <a:p>
             <a:fld id="{BDB90D4E-B4B4-AA4D-8C3E-EED2DA1EB551}" type="datetimeFigureOut">
               <a:rPr lang="pl-PL" smtClean="0"/>
-              <a:t>25.11.2019</a:t>
+              <a:t>26.11.2019</a:t>
             </a:fld>
             <a:endParaRPr lang="pl-PL"/>
           </a:p>
@@ -8615,7 +8616,7 @@
           <a:p>
             <a:fld id="{BDB90D4E-B4B4-AA4D-8C3E-EED2DA1EB551}" type="datetimeFigureOut">
               <a:rPr lang="pl-PL" smtClean="0"/>
-              <a:t>25.11.2019</a:t>
+              <a:t>26.11.2019</a:t>
             </a:fld>
             <a:endParaRPr lang="pl-PL"/>
           </a:p>
@@ -8891,7 +8892,7 @@
           <a:p>
             <a:fld id="{BDB90D4E-B4B4-AA4D-8C3E-EED2DA1EB551}" type="datetimeFigureOut">
               <a:rPr lang="pl-PL" smtClean="0"/>
-              <a:t>25.11.2019</a:t>
+              <a:t>26.11.2019</a:t>
             </a:fld>
             <a:endParaRPr lang="pl-PL"/>
           </a:p>
@@ -9159,7 +9160,7 @@
           <a:p>
             <a:fld id="{BDB90D4E-B4B4-AA4D-8C3E-EED2DA1EB551}" type="datetimeFigureOut">
               <a:rPr lang="pl-PL" smtClean="0"/>
-              <a:t>25.11.2019</a:t>
+              <a:t>26.11.2019</a:t>
             </a:fld>
             <a:endParaRPr lang="pl-PL"/>
           </a:p>
@@ -9574,7 +9575,7 @@
           <a:p>
             <a:fld id="{BDB90D4E-B4B4-AA4D-8C3E-EED2DA1EB551}" type="datetimeFigureOut">
               <a:rPr lang="pl-PL" smtClean="0"/>
-              <a:t>25.11.2019</a:t>
+              <a:t>26.11.2019</a:t>
             </a:fld>
             <a:endParaRPr lang="pl-PL"/>
           </a:p>
@@ -9716,7 +9717,7 @@
           <a:p>
             <a:fld id="{BDB90D4E-B4B4-AA4D-8C3E-EED2DA1EB551}" type="datetimeFigureOut">
               <a:rPr lang="pl-PL" smtClean="0"/>
-              <a:t>25.11.2019</a:t>
+              <a:t>26.11.2019</a:t>
             </a:fld>
             <a:endParaRPr lang="pl-PL"/>
           </a:p>
@@ -9829,7 +9830,7 @@
           <a:p>
             <a:fld id="{BDB90D4E-B4B4-AA4D-8C3E-EED2DA1EB551}" type="datetimeFigureOut">
               <a:rPr lang="pl-PL" smtClean="0"/>
-              <a:t>25.11.2019</a:t>
+              <a:t>26.11.2019</a:t>
             </a:fld>
             <a:endParaRPr lang="pl-PL"/>
           </a:p>
@@ -10142,7 +10143,7 @@
           <a:p>
             <a:fld id="{BDB90D4E-B4B4-AA4D-8C3E-EED2DA1EB551}" type="datetimeFigureOut">
               <a:rPr lang="pl-PL" smtClean="0"/>
-              <a:t>25.11.2019</a:t>
+              <a:t>26.11.2019</a:t>
             </a:fld>
             <a:endParaRPr lang="pl-PL"/>
           </a:p>
@@ -10431,7 +10432,7 @@
           <a:p>
             <a:fld id="{BDB90D4E-B4B4-AA4D-8C3E-EED2DA1EB551}" type="datetimeFigureOut">
               <a:rPr lang="pl-PL" smtClean="0"/>
-              <a:t>25.11.2019</a:t>
+              <a:t>26.11.2019</a:t>
             </a:fld>
             <a:endParaRPr lang="pl-PL"/>
           </a:p>
@@ -10674,7 +10675,7 @@
           <a:p>
             <a:fld id="{BDB90D4E-B4B4-AA4D-8C3E-EED2DA1EB551}" type="datetimeFigureOut">
               <a:rPr lang="pl-PL" smtClean="0"/>
-              <a:t>25.11.2019</a:t>
+              <a:t>26.11.2019</a:t>
             </a:fld>
             <a:endParaRPr lang="pl-PL"/>
           </a:p>
@@ -16742,7 +16743,7 @@
                 <a:latin typeface="Futura Medium" panose="020B0602020204020303" pitchFamily="34" charset="-79"/>
                 <a:cs typeface="Futura Medium" panose="020B0602020204020303" pitchFamily="34" charset="-79"/>
               </a:rPr>
-              <a:t> I</a:t>
+              <a:t> (part I)</a:t>
             </a:r>
           </a:p>
         </p:txBody>
@@ -17584,7 +17585,7 @@
                 <a:latin typeface="Futura Medium" panose="020B0602020204020303" pitchFamily="34" charset="-79"/>
                 <a:cs typeface="Futura Medium" panose="020B0602020204020303" pitchFamily="34" charset="-79"/>
               </a:rPr>
-              <a:t> II</a:t>
+              <a:t> (part II)</a:t>
             </a:r>
           </a:p>
         </p:txBody>
@@ -24804,11 +24805,7 @@
           </p:cNvGraphicFramePr>
           <p:nvPr>
             <p:ph idx="1"/>
-            <p:extLst>
-              <p:ext uri="{D42A27DB-BD31-4B8C-83A1-F6EECF244321}">
-                <p14:modId xmlns:p14="http://schemas.microsoft.com/office/powerpoint/2010/main" val="1002693026"/>
-              </p:ext>
-            </p:extLst>
+            <p:extLst/>
           </p:nvPr>
         </p:nvGraphicFramePr>
         <p:xfrm>
@@ -25483,7 +25480,7 @@
     </p:spTree>
     <p:extLst>
       <p:ext uri="{BB962C8B-B14F-4D97-AF65-F5344CB8AC3E}">
-        <p14:creationId xmlns:p14="http://schemas.microsoft.com/office/powerpoint/2010/main" val="3574122939"/>
+        <p14:creationId xmlns:p14="http://schemas.microsoft.com/office/powerpoint/2010/main" val="385012657"/>
       </p:ext>
     </p:extLst>
   </p:cSld>
@@ -25494,6 +25491,658 @@
 </file>
 
 <file path=ppt/slides/slide25.xml><?xml version="1.0" encoding="utf-8"?>
+<p:sld xmlns:a="http://schemas.openxmlformats.org/drawingml/2006/main" xmlns:r="http://schemas.openxmlformats.org/officeDocument/2006/relationships" xmlns:p="http://schemas.openxmlformats.org/presentationml/2006/main">
+  <p:cSld>
+    <p:spTree>
+      <p:nvGrpSpPr>
+        <p:cNvPr id="1" name=""/>
+        <p:cNvGrpSpPr/>
+        <p:nvPr/>
+      </p:nvGrpSpPr>
+      <p:grpSpPr>
+        <a:xfrm>
+          <a:off x="0" y="0"/>
+          <a:ext cx="0" cy="0"/>
+          <a:chOff x="0" y="0"/>
+          <a:chExt cx="0" cy="0"/>
+        </a:xfrm>
+      </p:grpSpPr>
+      <p:sp>
+        <p:nvSpPr>
+          <p:cNvPr id="2" name="Title 1">
+            <a:extLst>
+              <a:ext uri="{FF2B5EF4-FFF2-40B4-BE49-F238E27FC236}">
+                <a16:creationId xmlns:a16="http://schemas.microsoft.com/office/drawing/2014/main" id="{F47BF6D4-89AF-724D-982F-87CBD8F29B01}"/>
+              </a:ext>
+            </a:extLst>
+          </p:cNvPr>
+          <p:cNvSpPr>
+            <a:spLocks noGrp="1"/>
+          </p:cNvSpPr>
+          <p:nvPr>
+            <p:ph type="title"/>
+          </p:nvPr>
+        </p:nvSpPr>
+        <p:spPr/>
+        <p:txBody>
+          <a:bodyPr>
+            <a:normAutofit/>
+          </a:bodyPr>
+          <a:lstStyle/>
+          <a:p>
+            <a:pPr algn="ctr"/>
+            <a:r>
+              <a:rPr lang="pl-PL" sz="3200" dirty="0">
+                <a:solidFill>
+                  <a:schemeClr val="accent1">
+                    <a:lumMod val="75000"/>
+                  </a:schemeClr>
+                </a:solidFill>
+                <a:latin typeface="Futura Medium" panose="020B0602020204020303" pitchFamily="34" charset="-79"/>
+                <a:cs typeface="Futura Medium" panose="020B0602020204020303" pitchFamily="34" charset="-79"/>
+              </a:rPr>
+              <a:t>How to </a:t>
+            </a:r>
+            <a:r>
+              <a:rPr lang="pl-PL" sz="3200" dirty="0" err="1">
+                <a:solidFill>
+                  <a:schemeClr val="accent1">
+                    <a:lumMod val="75000"/>
+                  </a:schemeClr>
+                </a:solidFill>
+                <a:latin typeface="Futura Medium" panose="020B0602020204020303" pitchFamily="34" charset="-79"/>
+                <a:cs typeface="Futura Medium" panose="020B0602020204020303" pitchFamily="34" charset="-79"/>
+              </a:rPr>
+              <a:t>understand</a:t>
+            </a:r>
+            <a:r>
+              <a:rPr lang="pl-PL" sz="3200" dirty="0">
+                <a:solidFill>
+                  <a:schemeClr val="accent1">
+                    <a:lumMod val="75000"/>
+                  </a:schemeClr>
+                </a:solidFill>
+                <a:latin typeface="Futura Medium" panose="020B0602020204020303" pitchFamily="34" charset="-79"/>
+                <a:cs typeface="Futura Medium" panose="020B0602020204020303" pitchFamily="34" charset="-79"/>
+              </a:rPr>
+              <a:t> </a:t>
+            </a:r>
+            <a:r>
+              <a:rPr lang="pl-PL" sz="3200" dirty="0" err="1">
+                <a:solidFill>
+                  <a:schemeClr val="accent1">
+                    <a:lumMod val="75000"/>
+                  </a:schemeClr>
+                </a:solidFill>
+                <a:latin typeface="Futura Medium" panose="020B0602020204020303" pitchFamily="34" charset="-79"/>
+                <a:cs typeface="Futura Medium" panose="020B0602020204020303" pitchFamily="34" charset="-79"/>
+              </a:rPr>
+              <a:t>numbers</a:t>
+            </a:r>
+            <a:r>
+              <a:rPr lang="pl-PL" sz="3200" dirty="0">
+                <a:solidFill>
+                  <a:schemeClr val="accent1">
+                    <a:lumMod val="75000"/>
+                  </a:schemeClr>
+                </a:solidFill>
+                <a:latin typeface="Futura Medium" panose="020B0602020204020303" pitchFamily="34" charset="-79"/>
+                <a:cs typeface="Futura Medium" panose="020B0602020204020303" pitchFamily="34" charset="-79"/>
+              </a:rPr>
+              <a:t> in </a:t>
+            </a:r>
+            <a:r>
+              <a:rPr lang="pl-PL" sz="3200" dirty="0" err="1">
+                <a:solidFill>
+                  <a:schemeClr val="accent1">
+                    <a:lumMod val="75000"/>
+                  </a:schemeClr>
+                </a:solidFill>
+                <a:latin typeface="Futura Medium" panose="020B0602020204020303" pitchFamily="34" charset="-79"/>
+                <a:cs typeface="Futura Medium" panose="020B0602020204020303" pitchFamily="34" charset="-79"/>
+              </a:rPr>
+              <a:t>table</a:t>
+            </a:r>
+            <a:r>
+              <a:rPr lang="pl-PL" sz="3200" dirty="0">
+                <a:solidFill>
+                  <a:schemeClr val="accent1">
+                    <a:lumMod val="75000"/>
+                  </a:schemeClr>
+                </a:solidFill>
+                <a:latin typeface="Futura Medium" panose="020B0602020204020303" pitchFamily="34" charset="-79"/>
+                <a:cs typeface="Futura Medium" panose="020B0602020204020303" pitchFamily="34" charset="-79"/>
+              </a:rPr>
+              <a:t> of 258 </a:t>
+            </a:r>
+            <a:r>
+              <a:rPr lang="pl-PL" sz="3200" dirty="0" err="1">
+                <a:solidFill>
+                  <a:schemeClr val="accent1">
+                    <a:lumMod val="75000"/>
+                  </a:schemeClr>
+                </a:solidFill>
+                <a:latin typeface="Futura Medium" panose="020B0602020204020303" pitchFamily="34" charset="-79"/>
+                <a:cs typeface="Futura Medium" panose="020B0602020204020303" pitchFamily="34" charset="-79"/>
+              </a:rPr>
+              <a:t>customers</a:t>
+            </a:r>
+            <a:r>
+              <a:rPr lang="pl-PL" sz="3200" dirty="0">
+                <a:solidFill>
+                  <a:schemeClr val="accent1">
+                    <a:lumMod val="75000"/>
+                  </a:schemeClr>
+                </a:solidFill>
+                <a:latin typeface="Futura Medium" panose="020B0602020204020303" pitchFamily="34" charset="-79"/>
+                <a:cs typeface="Futura Medium" panose="020B0602020204020303" pitchFamily="34" charset="-79"/>
+              </a:rPr>
+              <a:t>?</a:t>
+            </a:r>
+          </a:p>
+        </p:txBody>
+      </p:sp>
+      <p:graphicFrame>
+        <p:nvGraphicFramePr>
+          <p:cNvPr id="4" name="Content Placeholder 3">
+            <a:extLst>
+              <a:ext uri="{FF2B5EF4-FFF2-40B4-BE49-F238E27FC236}">
+                <a16:creationId xmlns:a16="http://schemas.microsoft.com/office/drawing/2014/main" id="{915BB019-793A-E642-A500-6EC0A9D19474}"/>
+              </a:ext>
+            </a:extLst>
+          </p:cNvPr>
+          <p:cNvGraphicFramePr>
+            <a:graphicFrameLocks noGrp="1"/>
+          </p:cNvGraphicFramePr>
+          <p:nvPr>
+            <p:ph idx="1"/>
+            <p:extLst>
+              <p:ext uri="{D42A27DB-BD31-4B8C-83A1-F6EECF244321}">
+                <p14:modId xmlns:p14="http://schemas.microsoft.com/office/powerpoint/2010/main" val="4018898642"/>
+              </p:ext>
+            </p:extLst>
+          </p:nvPr>
+        </p:nvGraphicFramePr>
+        <p:xfrm>
+          <a:off x="838200" y="1825624"/>
+          <a:ext cx="10515600" cy="3019508"/>
+        </p:xfrm>
+        <a:graphic>
+          <a:graphicData uri="http://schemas.openxmlformats.org/drawingml/2006/table">
+            <a:tbl>
+              <a:tblPr firstRow="1" bandRow="1">
+                <a:tableStyleId>{2D5ABB26-0587-4C30-8999-92F81FD0307C}</a:tableStyleId>
+              </a:tblPr>
+              <a:tblGrid>
+                <a:gridCol w="5257800">
+                  <a:extLst>
+                    <a:ext uri="{9D8B030D-6E8A-4147-A177-3AD203B41FA5}">
+                      <a16:colId xmlns:a16="http://schemas.microsoft.com/office/drawing/2014/main" val="367663289"/>
+                    </a:ext>
+                  </a:extLst>
+                </a:gridCol>
+                <a:gridCol w="5257800">
+                  <a:extLst>
+                    <a:ext uri="{9D8B030D-6E8A-4147-A177-3AD203B41FA5}">
+                      <a16:colId xmlns:a16="http://schemas.microsoft.com/office/drawing/2014/main" val="1941445886"/>
+                    </a:ext>
+                  </a:extLst>
+                </a:gridCol>
+              </a:tblGrid>
+              <a:tr h="1509754">
+                <a:tc>
+                  <a:txBody>
+                    <a:bodyPr/>
+                    <a:lstStyle/>
+                    <a:p>
+                      <a:endParaRPr lang="pl-PL" dirty="0"/>
+                    </a:p>
+                  </a:txBody>
+                  <a:tcPr>
+                    <a:lnL w="12700" cap="flat" cmpd="sng" algn="ctr">
+                      <a:solidFill>
+                        <a:schemeClr val="bg2">
+                          <a:lumMod val="90000"/>
+                        </a:schemeClr>
+                      </a:solidFill>
+                      <a:prstDash val="solid"/>
+                      <a:round/>
+                      <a:headEnd type="none" w="med" len="med"/>
+                      <a:tailEnd type="none" w="med" len="med"/>
+                    </a:lnL>
+                    <a:lnR w="12700" cap="flat" cmpd="sng" algn="ctr">
+                      <a:solidFill>
+                        <a:schemeClr val="bg2">
+                          <a:lumMod val="90000"/>
+                        </a:schemeClr>
+                      </a:solidFill>
+                      <a:prstDash val="solid"/>
+                      <a:round/>
+                      <a:headEnd type="none" w="med" len="med"/>
+                      <a:tailEnd type="none" w="med" len="med"/>
+                    </a:lnR>
+                    <a:lnT w="12700" cap="flat" cmpd="sng" algn="ctr">
+                      <a:solidFill>
+                        <a:schemeClr val="bg2">
+                          <a:lumMod val="90000"/>
+                        </a:schemeClr>
+                      </a:solidFill>
+                      <a:prstDash val="solid"/>
+                      <a:round/>
+                      <a:headEnd type="none" w="med" len="med"/>
+                      <a:tailEnd type="none" w="med" len="med"/>
+                    </a:lnT>
+                    <a:lnB w="12700" cap="flat" cmpd="sng" algn="ctr">
+                      <a:solidFill>
+                        <a:schemeClr val="bg2">
+                          <a:lumMod val="90000"/>
+                        </a:schemeClr>
+                      </a:solidFill>
+                      <a:prstDash val="solid"/>
+                      <a:round/>
+                      <a:headEnd type="none" w="med" len="med"/>
+                      <a:tailEnd type="none" w="med" len="med"/>
+                    </a:lnB>
+                  </a:tcPr>
+                </a:tc>
+                <a:tc>
+                  <a:txBody>
+                    <a:bodyPr/>
+                    <a:lstStyle/>
+                    <a:p>
+                      <a:pPr algn="ctr"/>
+                      <a:endParaRPr lang="pl-PL" dirty="0">
+                        <a:solidFill>
+                          <a:schemeClr val="tx1">
+                            <a:lumMod val="65000"/>
+                            <a:lumOff val="35000"/>
+                          </a:schemeClr>
+                        </a:solidFill>
+                        <a:latin typeface="Futura Medium" panose="020B0602020204020303" pitchFamily="34" charset="-79"/>
+                        <a:cs typeface="Futura Medium" panose="020B0602020204020303" pitchFamily="34" charset="-79"/>
+                      </a:endParaRPr>
+                    </a:p>
+                  </a:txBody>
+                  <a:tcPr>
+                    <a:lnL w="12700" cap="flat" cmpd="sng" algn="ctr">
+                      <a:solidFill>
+                        <a:schemeClr val="bg2">
+                          <a:lumMod val="90000"/>
+                        </a:schemeClr>
+                      </a:solidFill>
+                      <a:prstDash val="solid"/>
+                      <a:round/>
+                      <a:headEnd type="none" w="med" len="med"/>
+                      <a:tailEnd type="none" w="med" len="med"/>
+                    </a:lnL>
+                    <a:lnR w="12700" cap="flat" cmpd="sng" algn="ctr">
+                      <a:solidFill>
+                        <a:schemeClr val="bg2">
+                          <a:lumMod val="90000"/>
+                        </a:schemeClr>
+                      </a:solidFill>
+                      <a:prstDash val="solid"/>
+                      <a:round/>
+                      <a:headEnd type="none" w="med" len="med"/>
+                      <a:tailEnd type="none" w="med" len="med"/>
+                    </a:lnR>
+                    <a:lnT w="12700" cap="flat" cmpd="sng" algn="ctr">
+                      <a:solidFill>
+                        <a:schemeClr val="bg2">
+                          <a:lumMod val="90000"/>
+                        </a:schemeClr>
+                      </a:solidFill>
+                      <a:prstDash val="solid"/>
+                      <a:round/>
+                      <a:headEnd type="none" w="med" len="med"/>
+                      <a:tailEnd type="none" w="med" len="med"/>
+                    </a:lnT>
+                    <a:lnB w="12700" cap="flat" cmpd="sng" algn="ctr">
+                      <a:solidFill>
+                        <a:schemeClr val="bg2">
+                          <a:lumMod val="90000"/>
+                        </a:schemeClr>
+                      </a:solidFill>
+                      <a:prstDash val="solid"/>
+                      <a:round/>
+                      <a:headEnd type="none" w="med" len="med"/>
+                      <a:tailEnd type="none" w="med" len="med"/>
+                    </a:lnB>
+                  </a:tcPr>
+                </a:tc>
+                <a:extLst>
+                  <a:ext uri="{0D108BD9-81ED-4DB2-BD59-A6C34878D82A}">
+                    <a16:rowId xmlns:a16="http://schemas.microsoft.com/office/drawing/2014/main" val="1761730026"/>
+                  </a:ext>
+                </a:extLst>
+              </a:tr>
+              <a:tr h="1509754">
+                <a:tc>
+                  <a:txBody>
+                    <a:bodyPr/>
+                    <a:lstStyle/>
+                    <a:p>
+                      <a:pPr algn="ctr"/>
+                      <a:r>
+                        <a:rPr lang="pl-PL" dirty="0">
+                          <a:solidFill>
+                            <a:schemeClr val="tx1">
+                              <a:lumMod val="65000"/>
+                              <a:lumOff val="35000"/>
+                            </a:schemeClr>
+                          </a:solidFill>
+                          <a:latin typeface="Futura Medium" panose="020B0602020204020303" pitchFamily="34" charset="-79"/>
+                          <a:cs typeface="Futura Medium" panose="020B0602020204020303" pitchFamily="34" charset="-79"/>
+                        </a:rPr>
+                        <a:t>not </a:t>
+                      </a:r>
+                      <a:r>
+                        <a:rPr lang="pl-PL" dirty="0" err="1">
+                          <a:solidFill>
+                            <a:schemeClr val="tx1">
+                              <a:lumMod val="65000"/>
+                              <a:lumOff val="35000"/>
+                            </a:schemeClr>
+                          </a:solidFill>
+                          <a:latin typeface="Futura Medium" panose="020B0602020204020303" pitchFamily="34" charset="-79"/>
+                          <a:cs typeface="Futura Medium" panose="020B0602020204020303" pitchFamily="34" charset="-79"/>
+                        </a:rPr>
+                        <a:t>identified</a:t>
+                      </a:r>
+                      <a:r>
+                        <a:rPr lang="pl-PL" dirty="0">
+                          <a:solidFill>
+                            <a:schemeClr val="tx1">
+                              <a:lumMod val="65000"/>
+                              <a:lumOff val="35000"/>
+                            </a:schemeClr>
+                          </a:solidFill>
+                          <a:latin typeface="Futura Medium" panose="020B0602020204020303" pitchFamily="34" charset="-79"/>
+                          <a:cs typeface="Futura Medium" panose="020B0602020204020303" pitchFamily="34" charset="-79"/>
+                        </a:rPr>
+                        <a:t> </a:t>
+                      </a:r>
+                      <a:r>
+                        <a:rPr lang="pl-PL" dirty="0" err="1">
+                          <a:solidFill>
+                            <a:schemeClr val="tx1">
+                              <a:lumMod val="65000"/>
+                              <a:lumOff val="35000"/>
+                            </a:schemeClr>
+                          </a:solidFill>
+                          <a:latin typeface="Futura Medium" panose="020B0602020204020303" pitchFamily="34" charset="-79"/>
+                          <a:cs typeface="Futura Medium" panose="020B0602020204020303" pitchFamily="34" charset="-79"/>
+                        </a:rPr>
+                        <a:t>customers</a:t>
+                      </a:r>
+                      <a:r>
+                        <a:rPr lang="pl-PL" dirty="0">
+                          <a:solidFill>
+                            <a:schemeClr val="tx1">
+                              <a:lumMod val="65000"/>
+                              <a:lumOff val="35000"/>
+                            </a:schemeClr>
+                          </a:solidFill>
+                          <a:latin typeface="Futura Medium" panose="020B0602020204020303" pitchFamily="34" charset="-79"/>
+                          <a:cs typeface="Futura Medium" panose="020B0602020204020303" pitchFamily="34" charset="-79"/>
+                        </a:rPr>
+                        <a:t> </a:t>
+                      </a:r>
+                      <a:r>
+                        <a:rPr lang="pl-PL" dirty="0" err="1">
+                          <a:solidFill>
+                            <a:schemeClr val="tx1">
+                              <a:lumMod val="65000"/>
+                              <a:lumOff val="35000"/>
+                            </a:schemeClr>
+                          </a:solidFill>
+                          <a:latin typeface="Futura Medium" panose="020B0602020204020303" pitchFamily="34" charset="-79"/>
+                          <a:cs typeface="Futura Medium" panose="020B0602020204020303" pitchFamily="34" charset="-79"/>
+                        </a:rPr>
+                        <a:t>who</a:t>
+                      </a:r>
+                      <a:r>
+                        <a:rPr lang="pl-PL" dirty="0">
+                          <a:solidFill>
+                            <a:schemeClr val="tx1">
+                              <a:lumMod val="65000"/>
+                              <a:lumOff val="35000"/>
+                            </a:schemeClr>
+                          </a:solidFill>
+                          <a:latin typeface="Futura Medium" panose="020B0602020204020303" pitchFamily="34" charset="-79"/>
+                          <a:cs typeface="Futura Medium" panose="020B0602020204020303" pitchFamily="34" charset="-79"/>
+                        </a:rPr>
+                        <a:t> </a:t>
+                      </a:r>
+                      <a:r>
+                        <a:rPr lang="pl-PL" dirty="0" err="1">
+                          <a:solidFill>
+                            <a:schemeClr val="tx1">
+                              <a:lumMod val="65000"/>
+                              <a:lumOff val="35000"/>
+                            </a:schemeClr>
+                          </a:solidFill>
+                          <a:latin typeface="Futura Medium" panose="020B0602020204020303" pitchFamily="34" charset="-79"/>
+                          <a:cs typeface="Futura Medium" panose="020B0602020204020303" pitchFamily="34" charset="-79"/>
+                        </a:rPr>
+                        <a:t>would</a:t>
+                      </a:r>
+                      <a:r>
+                        <a:rPr lang="pl-PL" dirty="0">
+                          <a:solidFill>
+                            <a:schemeClr val="tx1">
+                              <a:lumMod val="65000"/>
+                              <a:lumOff val="35000"/>
+                            </a:schemeClr>
+                          </a:solidFill>
+                          <a:latin typeface="Futura Medium" panose="020B0602020204020303" pitchFamily="34" charset="-79"/>
+                          <a:cs typeface="Futura Medium" panose="020B0602020204020303" pitchFamily="34" charset="-79"/>
+                        </a:rPr>
+                        <a:t> </a:t>
+                      </a:r>
+                      <a:r>
+                        <a:rPr lang="pl-PL" dirty="0" err="1">
+                          <a:solidFill>
+                            <a:schemeClr val="tx1">
+                              <a:lumMod val="65000"/>
+                              <a:lumOff val="35000"/>
+                            </a:schemeClr>
+                          </a:solidFill>
+                          <a:latin typeface="Futura Medium" panose="020B0602020204020303" pitchFamily="34" charset="-79"/>
+                          <a:cs typeface="Futura Medium" panose="020B0602020204020303" pitchFamily="34" charset="-79"/>
+                        </a:rPr>
+                        <a:t>accept</a:t>
+                      </a:r>
+                      <a:endParaRPr lang="pl-PL" dirty="0">
+                        <a:solidFill>
+                          <a:schemeClr val="tx1">
+                            <a:lumMod val="65000"/>
+                            <a:lumOff val="35000"/>
+                          </a:schemeClr>
+                        </a:solidFill>
+                        <a:latin typeface="Futura Medium" panose="020B0602020204020303" pitchFamily="34" charset="-79"/>
+                        <a:cs typeface="Futura Medium" panose="020B0602020204020303" pitchFamily="34" charset="-79"/>
+                      </a:endParaRPr>
+                    </a:p>
+                    <a:p>
+                      <a:pPr algn="ctr"/>
+                      <a:r>
+                        <a:rPr lang="pl-PL" dirty="0" err="1">
+                          <a:solidFill>
+                            <a:schemeClr val="tx1">
+                              <a:lumMod val="65000"/>
+                              <a:lumOff val="35000"/>
+                            </a:schemeClr>
+                          </a:solidFill>
+                          <a:latin typeface="Futura Medium" panose="020B0602020204020303" pitchFamily="34" charset="-79"/>
+                          <a:cs typeface="Futura Medium" panose="020B0602020204020303" pitchFamily="34" charset="-79"/>
+                        </a:rPr>
+                        <a:t>our</a:t>
+                      </a:r>
+                      <a:r>
+                        <a:rPr lang="pl-PL" dirty="0">
+                          <a:solidFill>
+                            <a:schemeClr val="tx1">
+                              <a:lumMod val="65000"/>
+                              <a:lumOff val="35000"/>
+                            </a:schemeClr>
+                          </a:solidFill>
+                          <a:latin typeface="Futura Medium" panose="020B0602020204020303" pitchFamily="34" charset="-79"/>
+                          <a:cs typeface="Futura Medium" panose="020B0602020204020303" pitchFamily="34" charset="-79"/>
+                        </a:rPr>
+                        <a:t> </a:t>
+                      </a:r>
+                      <a:r>
+                        <a:rPr lang="pl-PL" dirty="0" err="1">
+                          <a:solidFill>
+                            <a:schemeClr val="tx1">
+                              <a:lumMod val="65000"/>
+                              <a:lumOff val="35000"/>
+                            </a:schemeClr>
+                          </a:solidFill>
+                          <a:latin typeface="Futura Medium" panose="020B0602020204020303" pitchFamily="34" charset="-79"/>
+                          <a:cs typeface="Futura Medium" panose="020B0602020204020303" pitchFamily="34" charset="-79"/>
+                        </a:rPr>
+                        <a:t>offer</a:t>
+                      </a:r>
+                      <a:endParaRPr lang="pl-PL" dirty="0">
+                        <a:solidFill>
+                          <a:schemeClr val="tx1">
+                            <a:lumMod val="65000"/>
+                            <a:lumOff val="35000"/>
+                          </a:schemeClr>
+                        </a:solidFill>
+                        <a:latin typeface="Futura Medium" panose="020B0602020204020303" pitchFamily="34" charset="-79"/>
+                        <a:cs typeface="Futura Medium" panose="020B0602020204020303" pitchFamily="34" charset="-79"/>
+                      </a:endParaRPr>
+                    </a:p>
+                  </a:txBody>
+                  <a:tcPr>
+                    <a:lnL w="12700" cap="flat" cmpd="sng" algn="ctr">
+                      <a:solidFill>
+                        <a:schemeClr val="bg2">
+                          <a:lumMod val="90000"/>
+                        </a:schemeClr>
+                      </a:solidFill>
+                      <a:prstDash val="solid"/>
+                      <a:round/>
+                      <a:headEnd type="none" w="med" len="med"/>
+                      <a:tailEnd type="none" w="med" len="med"/>
+                    </a:lnL>
+                    <a:lnR w="12700" cap="flat" cmpd="sng" algn="ctr">
+                      <a:solidFill>
+                        <a:schemeClr val="bg2">
+                          <a:lumMod val="90000"/>
+                        </a:schemeClr>
+                      </a:solidFill>
+                      <a:prstDash val="solid"/>
+                      <a:round/>
+                      <a:headEnd type="none" w="med" len="med"/>
+                      <a:tailEnd type="none" w="med" len="med"/>
+                    </a:lnR>
+                    <a:lnT w="12700" cap="flat" cmpd="sng" algn="ctr">
+                      <a:solidFill>
+                        <a:schemeClr val="bg2">
+                          <a:lumMod val="90000"/>
+                        </a:schemeClr>
+                      </a:solidFill>
+                      <a:prstDash val="solid"/>
+                      <a:round/>
+                      <a:headEnd type="none" w="med" len="med"/>
+                      <a:tailEnd type="none" w="med" len="med"/>
+                    </a:lnT>
+                    <a:lnB w="12700" cap="flat" cmpd="sng" algn="ctr">
+                      <a:solidFill>
+                        <a:schemeClr val="bg2">
+                          <a:lumMod val="90000"/>
+                        </a:schemeClr>
+                      </a:solidFill>
+                      <a:prstDash val="solid"/>
+                      <a:round/>
+                      <a:headEnd type="none" w="med" len="med"/>
+                      <a:tailEnd type="none" w="med" len="med"/>
+                    </a:lnB>
+                  </a:tcPr>
+                </a:tc>
+                <a:tc>
+                  <a:txBody>
+                    <a:bodyPr/>
+                    <a:lstStyle/>
+                    <a:p>
+                      <a:endParaRPr lang="pl-PL" dirty="0"/>
+                    </a:p>
+                  </a:txBody>
+                  <a:tcPr>
+                    <a:lnL w="12700" cap="flat" cmpd="sng" algn="ctr">
+                      <a:solidFill>
+                        <a:schemeClr val="bg2">
+                          <a:lumMod val="90000"/>
+                        </a:schemeClr>
+                      </a:solidFill>
+                      <a:prstDash val="solid"/>
+                      <a:round/>
+                      <a:headEnd type="none" w="med" len="med"/>
+                      <a:tailEnd type="none" w="med" len="med"/>
+                    </a:lnL>
+                    <a:lnR w="12700" cap="flat" cmpd="sng" algn="ctr">
+                      <a:solidFill>
+                        <a:schemeClr val="bg2">
+                          <a:lumMod val="90000"/>
+                        </a:schemeClr>
+                      </a:solidFill>
+                      <a:prstDash val="solid"/>
+                      <a:round/>
+                      <a:headEnd type="none" w="med" len="med"/>
+                      <a:tailEnd type="none" w="med" len="med"/>
+                    </a:lnR>
+                    <a:lnT w="12700" cap="flat" cmpd="sng" algn="ctr">
+                      <a:solidFill>
+                        <a:schemeClr val="bg2">
+                          <a:lumMod val="90000"/>
+                        </a:schemeClr>
+                      </a:solidFill>
+                      <a:prstDash val="solid"/>
+                      <a:round/>
+                      <a:headEnd type="none" w="med" len="med"/>
+                      <a:tailEnd type="none" w="med" len="med"/>
+                    </a:lnT>
+                    <a:lnB w="12700" cap="flat" cmpd="sng" algn="ctr">
+                      <a:solidFill>
+                        <a:schemeClr val="bg2">
+                          <a:lumMod val="90000"/>
+                        </a:schemeClr>
+                      </a:solidFill>
+                      <a:prstDash val="solid"/>
+                      <a:round/>
+                      <a:headEnd type="none" w="med" len="med"/>
+                      <a:tailEnd type="none" w="med" len="med"/>
+                    </a:lnB>
+                  </a:tcPr>
+                </a:tc>
+                <a:extLst>
+                  <a:ext uri="{0D108BD9-81ED-4DB2-BD59-A6C34878D82A}">
+                    <a16:rowId xmlns:a16="http://schemas.microsoft.com/office/drawing/2014/main" val="1589267778"/>
+                  </a:ext>
+                </a:extLst>
+              </a:tr>
+            </a:tbl>
+          </a:graphicData>
+        </a:graphic>
+      </p:graphicFrame>
+    </p:spTree>
+    <p:extLst>
+      <p:ext uri="{BB962C8B-B14F-4D97-AF65-F5344CB8AC3E}">
+        <p14:creationId xmlns:p14="http://schemas.microsoft.com/office/powerpoint/2010/main" val="294529702"/>
+      </p:ext>
+    </p:extLst>
+  </p:cSld>
+  <p:clrMapOvr>
+    <a:masterClrMapping/>
+  </p:clrMapOvr>
+</p:sld>
+</file>
+
+<file path=ppt/slides/slide26.xml><?xml version="1.0" encoding="utf-8"?>
 <p:sld xmlns:a="http://schemas.openxmlformats.org/drawingml/2006/main" xmlns:r="http://schemas.openxmlformats.org/officeDocument/2006/relationships" xmlns:p="http://schemas.openxmlformats.org/presentationml/2006/main">
   <p:cSld>
     <p:spTree>
@@ -27064,7 +27713,7 @@
 </p:sld>
 </file>
 
-<file path=ppt/slides/slide26.xml><?xml version="1.0" encoding="utf-8"?>
+<file path=ppt/slides/slide27.xml><?xml version="1.0" encoding="utf-8"?>
 <p:sld xmlns:a="http://schemas.openxmlformats.org/drawingml/2006/main" xmlns:r="http://schemas.openxmlformats.org/officeDocument/2006/relationships" xmlns:p="http://schemas.openxmlformats.org/presentationml/2006/main">
   <p:cSld>
     <p:spTree>
@@ -28578,7 +29227,7 @@
 </p:sld>
 </file>
 
-<file path=ppt/slides/slide27.xml><?xml version="1.0" encoding="utf-8"?>
+<file path=ppt/slides/slide28.xml><?xml version="1.0" encoding="utf-8"?>
 <p:sld xmlns:a="http://schemas.openxmlformats.org/drawingml/2006/main" xmlns:r="http://schemas.openxmlformats.org/officeDocument/2006/relationships" xmlns:p="http://schemas.openxmlformats.org/presentationml/2006/main">
   <p:cSld>
     <p:spTree>
@@ -30059,7 +30708,7 @@
 </p:sld>
 </file>
 
-<file path=ppt/slides/slide28.xml><?xml version="1.0" encoding="utf-8"?>
+<file path=ppt/slides/slide29.xml><?xml version="1.0" encoding="utf-8"?>
 <p:sld xmlns:a="http://schemas.openxmlformats.org/drawingml/2006/main" xmlns:r="http://schemas.openxmlformats.org/officeDocument/2006/relationships" xmlns:p="http://schemas.openxmlformats.org/presentationml/2006/main">
   <p:cSld>
     <p:spTree>
@@ -30511,7 +31160,461 @@
 </p:sld>
 </file>
 
-<file path=ppt/slides/slide29.xml><?xml version="1.0" encoding="utf-8"?>
+<file path=ppt/slides/slide3.xml><?xml version="1.0" encoding="utf-8"?>
+<p:sld xmlns:a="http://schemas.openxmlformats.org/drawingml/2006/main" xmlns:r="http://schemas.openxmlformats.org/officeDocument/2006/relationships" xmlns:p="http://schemas.openxmlformats.org/presentationml/2006/main">
+  <p:cSld>
+    <p:spTree>
+      <p:nvGrpSpPr>
+        <p:cNvPr id="1" name=""/>
+        <p:cNvGrpSpPr/>
+        <p:nvPr/>
+      </p:nvGrpSpPr>
+      <p:grpSpPr>
+        <a:xfrm>
+          <a:off x="0" y="0"/>
+          <a:ext cx="0" cy="0"/>
+          <a:chOff x="0" y="0"/>
+          <a:chExt cx="0" cy="0"/>
+        </a:xfrm>
+      </p:grpSpPr>
+      <p:sp>
+        <p:nvSpPr>
+          <p:cNvPr id="2" name="Title 1">
+            <a:extLst>
+              <a:ext uri="{FF2B5EF4-FFF2-40B4-BE49-F238E27FC236}">
+                <a16:creationId xmlns:a16="http://schemas.microsoft.com/office/drawing/2014/main" id="{F47BF6D4-89AF-724D-982F-87CBD8F29B01}"/>
+              </a:ext>
+            </a:extLst>
+          </p:cNvPr>
+          <p:cNvSpPr>
+            <a:spLocks noGrp="1"/>
+          </p:cNvSpPr>
+          <p:nvPr>
+            <p:ph type="title"/>
+          </p:nvPr>
+        </p:nvSpPr>
+        <p:spPr/>
+        <p:txBody>
+          <a:bodyPr>
+            <a:normAutofit/>
+          </a:bodyPr>
+          <a:lstStyle/>
+          <a:p>
+            <a:pPr algn="ctr"/>
+            <a:r>
+              <a:rPr lang="pl-PL" sz="3200" dirty="0">
+                <a:solidFill>
+                  <a:schemeClr val="accent1">
+                    <a:lumMod val="75000"/>
+                  </a:schemeClr>
+                </a:solidFill>
+                <a:latin typeface="Futura Medium" panose="020B0602020204020303" pitchFamily="34" charset="-79"/>
+                <a:cs typeface="Futura Medium" panose="020B0602020204020303" pitchFamily="34" charset="-79"/>
+              </a:rPr>
+              <a:t>Agenda</a:t>
+            </a:r>
+          </a:p>
+        </p:txBody>
+      </p:sp>
+      <p:sp>
+        <p:nvSpPr>
+          <p:cNvPr id="3" name="Content Placeholder 2">
+            <a:extLst>
+              <a:ext uri="{FF2B5EF4-FFF2-40B4-BE49-F238E27FC236}">
+                <a16:creationId xmlns:a16="http://schemas.microsoft.com/office/drawing/2014/main" id="{37567E70-E983-FC41-9D5E-32F7CA0480D4}"/>
+              </a:ext>
+            </a:extLst>
+          </p:cNvPr>
+          <p:cNvSpPr>
+            <a:spLocks noGrp="1"/>
+          </p:cNvSpPr>
+          <p:nvPr>
+            <p:ph idx="1"/>
+          </p:nvPr>
+        </p:nvSpPr>
+        <p:spPr/>
+        <p:txBody>
+          <a:bodyPr>
+            <a:normAutofit/>
+          </a:bodyPr>
+          <a:lstStyle/>
+          <a:p>
+            <a:pPr marL="514350" indent="-514350">
+              <a:buClr>
+                <a:schemeClr val="accent2"/>
+              </a:buClr>
+              <a:buFont typeface="+mj-lt"/>
+              <a:buAutoNum type="arabicPeriod"/>
+            </a:pPr>
+            <a:r>
+              <a:rPr lang="pl-PL" dirty="0">
+                <a:solidFill>
+                  <a:schemeClr val="accent2"/>
+                </a:solidFill>
+                <a:latin typeface="Futura Medium" panose="020B0602020204020303" pitchFamily="34" charset="-79"/>
+                <a:cs typeface="Futura Medium" panose="020B0602020204020303" pitchFamily="34" charset="-79"/>
+              </a:rPr>
+              <a:t>Problem </a:t>
+            </a:r>
+            <a:r>
+              <a:rPr lang="pl-PL" dirty="0" err="1">
+                <a:solidFill>
+                  <a:schemeClr val="accent2"/>
+                </a:solidFill>
+                <a:latin typeface="Futura Medium" panose="020B0602020204020303" pitchFamily="34" charset="-79"/>
+                <a:cs typeface="Futura Medium" panose="020B0602020204020303" pitchFamily="34" charset="-79"/>
+              </a:rPr>
+              <a:t>overview</a:t>
+            </a:r>
+            <a:r>
+              <a:rPr lang="pl-PL" dirty="0">
+                <a:solidFill>
+                  <a:schemeClr val="accent2"/>
+                </a:solidFill>
+                <a:latin typeface="Futura Medium" panose="020B0602020204020303" pitchFamily="34" charset="-79"/>
+                <a:cs typeface="Futura Medium" panose="020B0602020204020303" pitchFamily="34" charset="-79"/>
+              </a:rPr>
+              <a:t> and </a:t>
+            </a:r>
+            <a:r>
+              <a:rPr lang="pl-PL" dirty="0" err="1">
+                <a:solidFill>
+                  <a:schemeClr val="accent2"/>
+                </a:solidFill>
+                <a:latin typeface="Futura Medium" panose="020B0602020204020303" pitchFamily="34" charset="-79"/>
+                <a:cs typeface="Futura Medium" panose="020B0602020204020303" pitchFamily="34" charset="-79"/>
+              </a:rPr>
+              <a:t>features</a:t>
+            </a:r>
+            <a:r>
+              <a:rPr lang="pl-PL" dirty="0">
+                <a:solidFill>
+                  <a:schemeClr val="accent2"/>
+                </a:solidFill>
+                <a:latin typeface="Futura Medium" panose="020B0602020204020303" pitchFamily="34" charset="-79"/>
+                <a:cs typeface="Futura Medium" panose="020B0602020204020303" pitchFamily="34" charset="-79"/>
+              </a:rPr>
+              <a:t> </a:t>
+            </a:r>
+            <a:r>
+              <a:rPr lang="pl-PL" dirty="0" err="1">
+                <a:solidFill>
+                  <a:schemeClr val="accent2"/>
+                </a:solidFill>
+                <a:latin typeface="Futura Medium" panose="020B0602020204020303" pitchFamily="34" charset="-79"/>
+                <a:cs typeface="Futura Medium" panose="020B0602020204020303" pitchFamily="34" charset="-79"/>
+              </a:rPr>
+              <a:t>transformation</a:t>
+            </a:r>
+            <a:endParaRPr lang="pl-PL" dirty="0">
+              <a:solidFill>
+                <a:schemeClr val="accent2"/>
+              </a:solidFill>
+              <a:latin typeface="Futura Medium" panose="020B0602020204020303" pitchFamily="34" charset="-79"/>
+              <a:cs typeface="Futura Medium" panose="020B0602020204020303" pitchFamily="34" charset="-79"/>
+            </a:endParaRPr>
+          </a:p>
+          <a:p>
+            <a:pPr marL="514350" indent="-514350">
+              <a:buClr>
+                <a:schemeClr val="accent2"/>
+              </a:buClr>
+              <a:buFont typeface="+mj-lt"/>
+              <a:buAutoNum type="arabicPeriod"/>
+            </a:pPr>
+            <a:r>
+              <a:rPr lang="pl-PL" dirty="0" err="1">
+                <a:solidFill>
+                  <a:schemeClr val="bg2">
+                    <a:lumMod val="90000"/>
+                  </a:schemeClr>
+                </a:solidFill>
+                <a:latin typeface="Futura Medium" panose="020B0602020204020303" pitchFamily="34" charset="-79"/>
+                <a:cs typeface="Futura Medium" panose="020B0602020204020303" pitchFamily="34" charset="-79"/>
+              </a:rPr>
+              <a:t>Insights</a:t>
+            </a:r>
+            <a:endParaRPr lang="pl-PL" dirty="0">
+              <a:solidFill>
+                <a:schemeClr val="bg2">
+                  <a:lumMod val="90000"/>
+                </a:schemeClr>
+              </a:solidFill>
+              <a:latin typeface="Futura Medium" panose="020B0602020204020303" pitchFamily="34" charset="-79"/>
+              <a:cs typeface="Futura Medium" panose="020B0602020204020303" pitchFamily="34" charset="-79"/>
+            </a:endParaRPr>
+          </a:p>
+          <a:p>
+            <a:pPr marL="514350" indent="-514350">
+              <a:buClr>
+                <a:schemeClr val="accent2"/>
+              </a:buClr>
+              <a:buFont typeface="+mj-lt"/>
+              <a:buAutoNum type="arabicPeriod"/>
+            </a:pPr>
+            <a:r>
+              <a:rPr lang="pl-PL" dirty="0">
+                <a:solidFill>
+                  <a:schemeClr val="bg2">
+                    <a:lumMod val="90000"/>
+                  </a:schemeClr>
+                </a:solidFill>
+                <a:latin typeface="Futura Medium" panose="020B0602020204020303" pitchFamily="34" charset="-79"/>
+                <a:cs typeface="Futura Medium" panose="020B0602020204020303" pitchFamily="34" charset="-79"/>
+              </a:rPr>
+              <a:t>Solution </a:t>
+            </a:r>
+            <a:r>
+              <a:rPr lang="pl-PL" dirty="0" err="1">
+                <a:solidFill>
+                  <a:schemeClr val="bg2">
+                    <a:lumMod val="90000"/>
+                  </a:schemeClr>
+                </a:solidFill>
+                <a:latin typeface="Futura Medium" panose="020B0602020204020303" pitchFamily="34" charset="-79"/>
+                <a:cs typeface="Futura Medium" panose="020B0602020204020303" pitchFamily="34" charset="-79"/>
+              </a:rPr>
+              <a:t>approach</a:t>
+            </a:r>
+            <a:r>
+              <a:rPr lang="pl-PL" dirty="0">
+                <a:solidFill>
+                  <a:schemeClr val="bg2">
+                    <a:lumMod val="90000"/>
+                  </a:schemeClr>
+                </a:solidFill>
+                <a:latin typeface="Futura Medium" panose="020B0602020204020303" pitchFamily="34" charset="-79"/>
+                <a:cs typeface="Futura Medium" panose="020B0602020204020303" pitchFamily="34" charset="-79"/>
+              </a:rPr>
+              <a:t> and a </a:t>
+            </a:r>
+            <a:r>
+              <a:rPr lang="pl-PL" dirty="0" err="1">
+                <a:solidFill>
+                  <a:schemeClr val="bg2">
+                    <a:lumMod val="90000"/>
+                  </a:schemeClr>
+                </a:solidFill>
+                <a:latin typeface="Futura Medium" panose="020B0602020204020303" pitchFamily="34" charset="-79"/>
+                <a:cs typeface="Futura Medium" panose="020B0602020204020303" pitchFamily="34" charset="-79"/>
+              </a:rPr>
+              <a:t>little</a:t>
+            </a:r>
+            <a:r>
+              <a:rPr lang="pl-PL" dirty="0">
+                <a:solidFill>
+                  <a:schemeClr val="bg2">
+                    <a:lumMod val="90000"/>
+                  </a:schemeClr>
+                </a:solidFill>
+                <a:latin typeface="Futura Medium" panose="020B0602020204020303" pitchFamily="34" charset="-79"/>
+                <a:cs typeface="Futura Medium" panose="020B0602020204020303" pitchFamily="34" charset="-79"/>
+              </a:rPr>
+              <a:t> bit of </a:t>
+            </a:r>
+            <a:r>
+              <a:rPr lang="pl-PL" dirty="0" err="1">
+                <a:solidFill>
+                  <a:schemeClr val="bg2">
+                    <a:lumMod val="90000"/>
+                  </a:schemeClr>
+                </a:solidFill>
+                <a:latin typeface="Futura Medium" panose="020B0602020204020303" pitchFamily="34" charset="-79"/>
+                <a:cs typeface="Futura Medium" panose="020B0602020204020303" pitchFamily="34" charset="-79"/>
+              </a:rPr>
+              <a:t>technical</a:t>
+            </a:r>
+            <a:r>
+              <a:rPr lang="pl-PL" dirty="0">
+                <a:solidFill>
+                  <a:schemeClr val="bg2">
+                    <a:lumMod val="90000"/>
+                  </a:schemeClr>
+                </a:solidFill>
+                <a:latin typeface="Futura Medium" panose="020B0602020204020303" pitchFamily="34" charset="-79"/>
+                <a:cs typeface="Futura Medium" panose="020B0602020204020303" pitchFamily="34" charset="-79"/>
+              </a:rPr>
+              <a:t> </a:t>
+            </a:r>
+            <a:r>
+              <a:rPr lang="pl-PL" dirty="0" err="1">
+                <a:solidFill>
+                  <a:schemeClr val="bg2">
+                    <a:lumMod val="90000"/>
+                  </a:schemeClr>
+                </a:solidFill>
+                <a:latin typeface="Futura Medium" panose="020B0602020204020303" pitchFamily="34" charset="-79"/>
+                <a:cs typeface="Futura Medium" panose="020B0602020204020303" pitchFamily="34" charset="-79"/>
+              </a:rPr>
+              <a:t>details</a:t>
+            </a:r>
+            <a:endParaRPr lang="pl-PL" dirty="0">
+              <a:solidFill>
+                <a:schemeClr val="bg2">
+                  <a:lumMod val="90000"/>
+                </a:schemeClr>
+              </a:solidFill>
+              <a:latin typeface="Futura Medium" panose="020B0602020204020303" pitchFamily="34" charset="-79"/>
+              <a:cs typeface="Futura Medium" panose="020B0602020204020303" pitchFamily="34" charset="-79"/>
+            </a:endParaRPr>
+          </a:p>
+          <a:p>
+            <a:pPr marL="514350" indent="-514350">
+              <a:buClr>
+                <a:schemeClr val="accent2"/>
+              </a:buClr>
+              <a:buFont typeface="+mj-lt"/>
+              <a:buAutoNum type="arabicPeriod"/>
+            </a:pPr>
+            <a:r>
+              <a:rPr lang="pl-PL" dirty="0" err="1">
+                <a:solidFill>
+                  <a:schemeClr val="bg2">
+                    <a:lumMod val="90000"/>
+                  </a:schemeClr>
+                </a:solidFill>
+                <a:latin typeface="Futura Medium" panose="020B0602020204020303" pitchFamily="34" charset="-79"/>
+                <a:cs typeface="Futura Medium" panose="020B0602020204020303" pitchFamily="34" charset="-79"/>
+              </a:rPr>
+              <a:t>What</a:t>
+            </a:r>
+            <a:r>
+              <a:rPr lang="pl-PL" dirty="0">
+                <a:solidFill>
+                  <a:schemeClr val="bg2">
+                    <a:lumMod val="90000"/>
+                  </a:schemeClr>
+                </a:solidFill>
+                <a:latin typeface="Futura Medium" panose="020B0602020204020303" pitchFamily="34" charset="-79"/>
+                <a:cs typeface="Futura Medium" panose="020B0602020204020303" pitchFamily="34" charset="-79"/>
+              </a:rPr>
+              <a:t> </a:t>
+            </a:r>
+            <a:r>
+              <a:rPr lang="pl-PL" dirty="0" err="1">
+                <a:solidFill>
+                  <a:schemeClr val="bg2">
+                    <a:lumMod val="90000"/>
+                  </a:schemeClr>
+                </a:solidFill>
+                <a:latin typeface="Futura Medium" panose="020B0602020204020303" pitchFamily="34" charset="-79"/>
+                <a:cs typeface="Futura Medium" panose="020B0602020204020303" pitchFamily="34" charset="-79"/>
+              </a:rPr>
+              <a:t>mostly</a:t>
+            </a:r>
+            <a:r>
+              <a:rPr lang="pl-PL" dirty="0">
+                <a:solidFill>
+                  <a:schemeClr val="bg2">
+                    <a:lumMod val="90000"/>
+                  </a:schemeClr>
+                </a:solidFill>
+                <a:latin typeface="Futura Medium" panose="020B0602020204020303" pitchFamily="34" charset="-79"/>
+                <a:cs typeface="Futura Medium" panose="020B0602020204020303" pitchFamily="34" charset="-79"/>
+              </a:rPr>
+              <a:t> </a:t>
+            </a:r>
+            <a:r>
+              <a:rPr lang="pl-PL" dirty="0" err="1">
+                <a:solidFill>
+                  <a:schemeClr val="bg2">
+                    <a:lumMod val="90000"/>
+                  </a:schemeClr>
+                </a:solidFill>
+                <a:latin typeface="Futura Medium" panose="020B0602020204020303" pitchFamily="34" charset="-79"/>
+                <a:cs typeface="Futura Medium" panose="020B0602020204020303" pitchFamily="34" charset="-79"/>
+              </a:rPr>
+              <a:t>impacted</a:t>
+            </a:r>
+            <a:r>
+              <a:rPr lang="pl-PL" dirty="0">
+                <a:solidFill>
+                  <a:schemeClr val="bg2">
+                    <a:lumMod val="90000"/>
+                  </a:schemeClr>
+                </a:solidFill>
+                <a:latin typeface="Futura Medium" panose="020B0602020204020303" pitchFamily="34" charset="-79"/>
+                <a:cs typeface="Futura Medium" panose="020B0602020204020303" pitchFamily="34" charset="-79"/>
+              </a:rPr>
+              <a:t> </a:t>
+            </a:r>
+            <a:r>
+              <a:rPr lang="pl-PL" dirty="0" err="1">
+                <a:solidFill>
+                  <a:schemeClr val="bg2">
+                    <a:lumMod val="90000"/>
+                  </a:schemeClr>
+                </a:solidFill>
+                <a:latin typeface="Futura Medium" panose="020B0602020204020303" pitchFamily="34" charset="-79"/>
+                <a:cs typeface="Futura Medium" panose="020B0602020204020303" pitchFamily="34" charset="-79"/>
+              </a:rPr>
+              <a:t>results</a:t>
+            </a:r>
+            <a:r>
+              <a:rPr lang="pl-PL" dirty="0">
+                <a:solidFill>
+                  <a:schemeClr val="bg2">
+                    <a:lumMod val="90000"/>
+                  </a:schemeClr>
+                </a:solidFill>
+                <a:latin typeface="Futura Medium" panose="020B0602020204020303" pitchFamily="34" charset="-79"/>
+                <a:cs typeface="Futura Medium" panose="020B0602020204020303" pitchFamily="34" charset="-79"/>
+              </a:rPr>
+              <a:t>?</a:t>
+            </a:r>
+          </a:p>
+          <a:p>
+            <a:pPr marL="514350" indent="-514350">
+              <a:buClr>
+                <a:schemeClr val="accent2"/>
+              </a:buClr>
+              <a:buFont typeface="+mj-lt"/>
+              <a:buAutoNum type="arabicPeriod"/>
+            </a:pPr>
+            <a:r>
+              <a:rPr lang="pl-PL" dirty="0" err="1">
+                <a:solidFill>
+                  <a:schemeClr val="bg2">
+                    <a:lumMod val="90000"/>
+                  </a:schemeClr>
+                </a:solidFill>
+                <a:latin typeface="Futura Medium" panose="020B0602020204020303" pitchFamily="34" charset="-79"/>
+                <a:cs typeface="Futura Medium" panose="020B0602020204020303" pitchFamily="34" charset="-79"/>
+              </a:rPr>
+              <a:t>Deliverables</a:t>
+            </a:r>
+            <a:endParaRPr lang="pl-PL" dirty="0">
+              <a:solidFill>
+                <a:schemeClr val="bg2">
+                  <a:lumMod val="90000"/>
+                </a:schemeClr>
+              </a:solidFill>
+              <a:latin typeface="Futura Medium" panose="020B0602020204020303" pitchFamily="34" charset="-79"/>
+              <a:cs typeface="Futura Medium" panose="020B0602020204020303" pitchFamily="34" charset="-79"/>
+            </a:endParaRPr>
+          </a:p>
+          <a:p>
+            <a:pPr marL="0" indent="0">
+              <a:buNone/>
+            </a:pPr>
+            <a:endParaRPr lang="pl-PL" dirty="0"/>
+          </a:p>
+        </p:txBody>
+      </p:sp>
+    </p:spTree>
+    <p:extLst>
+      <p:ext uri="{BB962C8B-B14F-4D97-AF65-F5344CB8AC3E}">
+        <p14:creationId xmlns:p14="http://schemas.microsoft.com/office/powerpoint/2010/main" val="4087740901"/>
+      </p:ext>
+    </p:extLst>
+  </p:cSld>
+  <p:clrMapOvr>
+    <a:masterClrMapping/>
+  </p:clrMapOvr>
+</p:sld>
+</file>
+
+<file path=ppt/slides/slide30.xml><?xml version="1.0" encoding="utf-8"?>
 <p:sld xmlns:a="http://schemas.openxmlformats.org/drawingml/2006/main" xmlns:r="http://schemas.openxmlformats.org/officeDocument/2006/relationships" xmlns:p="http://schemas.openxmlformats.org/presentationml/2006/main">
   <p:cSld>
     <p:spTree>
@@ -33917,7 +35020,7 @@
 </p:sld>
 </file>
 
-<file path=ppt/slides/slide3.xml><?xml version="1.0" encoding="utf-8"?>
+<file path=ppt/slides/slide31.xml><?xml version="1.0" encoding="utf-8"?>
 <p:sld xmlns:a="http://schemas.openxmlformats.org/drawingml/2006/main" xmlns:r="http://schemas.openxmlformats.org/officeDocument/2006/relationships" xmlns:p="http://schemas.openxmlformats.org/presentationml/2006/main">
   <p:cSld>
     <p:spTree>
@@ -34006,460 +35109,6 @@
             <a:r>
               <a:rPr lang="pl-PL" dirty="0">
                 <a:solidFill>
-                  <a:schemeClr val="accent2"/>
-                </a:solidFill>
-                <a:latin typeface="Futura Medium" panose="020B0602020204020303" pitchFamily="34" charset="-79"/>
-                <a:cs typeface="Futura Medium" panose="020B0602020204020303" pitchFamily="34" charset="-79"/>
-              </a:rPr>
-              <a:t>Problem </a:t>
-            </a:r>
-            <a:r>
-              <a:rPr lang="pl-PL" dirty="0" err="1">
-                <a:solidFill>
-                  <a:schemeClr val="accent2"/>
-                </a:solidFill>
-                <a:latin typeface="Futura Medium" panose="020B0602020204020303" pitchFamily="34" charset="-79"/>
-                <a:cs typeface="Futura Medium" panose="020B0602020204020303" pitchFamily="34" charset="-79"/>
-              </a:rPr>
-              <a:t>overview</a:t>
-            </a:r>
-            <a:r>
-              <a:rPr lang="pl-PL" dirty="0">
-                <a:solidFill>
-                  <a:schemeClr val="accent2"/>
-                </a:solidFill>
-                <a:latin typeface="Futura Medium" panose="020B0602020204020303" pitchFamily="34" charset="-79"/>
-                <a:cs typeface="Futura Medium" panose="020B0602020204020303" pitchFamily="34" charset="-79"/>
-              </a:rPr>
-              <a:t> and </a:t>
-            </a:r>
-            <a:r>
-              <a:rPr lang="pl-PL" dirty="0" err="1">
-                <a:solidFill>
-                  <a:schemeClr val="accent2"/>
-                </a:solidFill>
-                <a:latin typeface="Futura Medium" panose="020B0602020204020303" pitchFamily="34" charset="-79"/>
-                <a:cs typeface="Futura Medium" panose="020B0602020204020303" pitchFamily="34" charset="-79"/>
-              </a:rPr>
-              <a:t>features</a:t>
-            </a:r>
-            <a:r>
-              <a:rPr lang="pl-PL" dirty="0">
-                <a:solidFill>
-                  <a:schemeClr val="accent2"/>
-                </a:solidFill>
-                <a:latin typeface="Futura Medium" panose="020B0602020204020303" pitchFamily="34" charset="-79"/>
-                <a:cs typeface="Futura Medium" panose="020B0602020204020303" pitchFamily="34" charset="-79"/>
-              </a:rPr>
-              <a:t> </a:t>
-            </a:r>
-            <a:r>
-              <a:rPr lang="pl-PL" dirty="0" err="1">
-                <a:solidFill>
-                  <a:schemeClr val="accent2"/>
-                </a:solidFill>
-                <a:latin typeface="Futura Medium" panose="020B0602020204020303" pitchFamily="34" charset="-79"/>
-                <a:cs typeface="Futura Medium" panose="020B0602020204020303" pitchFamily="34" charset="-79"/>
-              </a:rPr>
-              <a:t>transformation</a:t>
-            </a:r>
-            <a:endParaRPr lang="pl-PL" dirty="0">
-              <a:solidFill>
-                <a:schemeClr val="accent2"/>
-              </a:solidFill>
-              <a:latin typeface="Futura Medium" panose="020B0602020204020303" pitchFamily="34" charset="-79"/>
-              <a:cs typeface="Futura Medium" panose="020B0602020204020303" pitchFamily="34" charset="-79"/>
-            </a:endParaRPr>
-          </a:p>
-          <a:p>
-            <a:pPr marL="514350" indent="-514350">
-              <a:buClr>
-                <a:schemeClr val="accent2"/>
-              </a:buClr>
-              <a:buFont typeface="+mj-lt"/>
-              <a:buAutoNum type="arabicPeriod"/>
-            </a:pPr>
-            <a:r>
-              <a:rPr lang="pl-PL" dirty="0" err="1">
-                <a:solidFill>
-                  <a:schemeClr val="bg2">
-                    <a:lumMod val="90000"/>
-                  </a:schemeClr>
-                </a:solidFill>
-                <a:latin typeface="Futura Medium" panose="020B0602020204020303" pitchFamily="34" charset="-79"/>
-                <a:cs typeface="Futura Medium" panose="020B0602020204020303" pitchFamily="34" charset="-79"/>
-              </a:rPr>
-              <a:t>Insights</a:t>
-            </a:r>
-            <a:endParaRPr lang="pl-PL" dirty="0">
-              <a:solidFill>
-                <a:schemeClr val="bg2">
-                  <a:lumMod val="90000"/>
-                </a:schemeClr>
-              </a:solidFill>
-              <a:latin typeface="Futura Medium" panose="020B0602020204020303" pitchFamily="34" charset="-79"/>
-              <a:cs typeface="Futura Medium" panose="020B0602020204020303" pitchFamily="34" charset="-79"/>
-            </a:endParaRPr>
-          </a:p>
-          <a:p>
-            <a:pPr marL="514350" indent="-514350">
-              <a:buClr>
-                <a:schemeClr val="accent2"/>
-              </a:buClr>
-              <a:buFont typeface="+mj-lt"/>
-              <a:buAutoNum type="arabicPeriod"/>
-            </a:pPr>
-            <a:r>
-              <a:rPr lang="pl-PL" dirty="0">
-                <a:solidFill>
-                  <a:schemeClr val="bg2">
-                    <a:lumMod val="90000"/>
-                  </a:schemeClr>
-                </a:solidFill>
-                <a:latin typeface="Futura Medium" panose="020B0602020204020303" pitchFamily="34" charset="-79"/>
-                <a:cs typeface="Futura Medium" panose="020B0602020204020303" pitchFamily="34" charset="-79"/>
-              </a:rPr>
-              <a:t>Solution </a:t>
-            </a:r>
-            <a:r>
-              <a:rPr lang="pl-PL" dirty="0" err="1">
-                <a:solidFill>
-                  <a:schemeClr val="bg2">
-                    <a:lumMod val="90000"/>
-                  </a:schemeClr>
-                </a:solidFill>
-                <a:latin typeface="Futura Medium" panose="020B0602020204020303" pitchFamily="34" charset="-79"/>
-                <a:cs typeface="Futura Medium" panose="020B0602020204020303" pitchFamily="34" charset="-79"/>
-              </a:rPr>
-              <a:t>approach</a:t>
-            </a:r>
-            <a:r>
-              <a:rPr lang="pl-PL" dirty="0">
-                <a:solidFill>
-                  <a:schemeClr val="bg2">
-                    <a:lumMod val="90000"/>
-                  </a:schemeClr>
-                </a:solidFill>
-                <a:latin typeface="Futura Medium" panose="020B0602020204020303" pitchFamily="34" charset="-79"/>
-                <a:cs typeface="Futura Medium" panose="020B0602020204020303" pitchFamily="34" charset="-79"/>
-              </a:rPr>
-              <a:t> and a </a:t>
-            </a:r>
-            <a:r>
-              <a:rPr lang="pl-PL" dirty="0" err="1">
-                <a:solidFill>
-                  <a:schemeClr val="bg2">
-                    <a:lumMod val="90000"/>
-                  </a:schemeClr>
-                </a:solidFill>
-                <a:latin typeface="Futura Medium" panose="020B0602020204020303" pitchFamily="34" charset="-79"/>
-                <a:cs typeface="Futura Medium" panose="020B0602020204020303" pitchFamily="34" charset="-79"/>
-              </a:rPr>
-              <a:t>little</a:t>
-            </a:r>
-            <a:r>
-              <a:rPr lang="pl-PL" dirty="0">
-                <a:solidFill>
-                  <a:schemeClr val="bg2">
-                    <a:lumMod val="90000"/>
-                  </a:schemeClr>
-                </a:solidFill>
-                <a:latin typeface="Futura Medium" panose="020B0602020204020303" pitchFamily="34" charset="-79"/>
-                <a:cs typeface="Futura Medium" panose="020B0602020204020303" pitchFamily="34" charset="-79"/>
-              </a:rPr>
-              <a:t> bit of </a:t>
-            </a:r>
-            <a:r>
-              <a:rPr lang="pl-PL" dirty="0" err="1">
-                <a:solidFill>
-                  <a:schemeClr val="bg2">
-                    <a:lumMod val="90000"/>
-                  </a:schemeClr>
-                </a:solidFill>
-                <a:latin typeface="Futura Medium" panose="020B0602020204020303" pitchFamily="34" charset="-79"/>
-                <a:cs typeface="Futura Medium" panose="020B0602020204020303" pitchFamily="34" charset="-79"/>
-              </a:rPr>
-              <a:t>technical</a:t>
-            </a:r>
-            <a:r>
-              <a:rPr lang="pl-PL" dirty="0">
-                <a:solidFill>
-                  <a:schemeClr val="bg2">
-                    <a:lumMod val="90000"/>
-                  </a:schemeClr>
-                </a:solidFill>
-                <a:latin typeface="Futura Medium" panose="020B0602020204020303" pitchFamily="34" charset="-79"/>
-                <a:cs typeface="Futura Medium" panose="020B0602020204020303" pitchFamily="34" charset="-79"/>
-              </a:rPr>
-              <a:t> </a:t>
-            </a:r>
-            <a:r>
-              <a:rPr lang="pl-PL" dirty="0" err="1">
-                <a:solidFill>
-                  <a:schemeClr val="bg2">
-                    <a:lumMod val="90000"/>
-                  </a:schemeClr>
-                </a:solidFill>
-                <a:latin typeface="Futura Medium" panose="020B0602020204020303" pitchFamily="34" charset="-79"/>
-                <a:cs typeface="Futura Medium" panose="020B0602020204020303" pitchFamily="34" charset="-79"/>
-              </a:rPr>
-              <a:t>details</a:t>
-            </a:r>
-            <a:endParaRPr lang="pl-PL" dirty="0">
-              <a:solidFill>
-                <a:schemeClr val="bg2">
-                  <a:lumMod val="90000"/>
-                </a:schemeClr>
-              </a:solidFill>
-              <a:latin typeface="Futura Medium" panose="020B0602020204020303" pitchFamily="34" charset="-79"/>
-              <a:cs typeface="Futura Medium" panose="020B0602020204020303" pitchFamily="34" charset="-79"/>
-            </a:endParaRPr>
-          </a:p>
-          <a:p>
-            <a:pPr marL="514350" indent="-514350">
-              <a:buClr>
-                <a:schemeClr val="accent2"/>
-              </a:buClr>
-              <a:buFont typeface="+mj-lt"/>
-              <a:buAutoNum type="arabicPeriod"/>
-            </a:pPr>
-            <a:r>
-              <a:rPr lang="pl-PL" dirty="0" err="1">
-                <a:solidFill>
-                  <a:schemeClr val="bg2">
-                    <a:lumMod val="90000"/>
-                  </a:schemeClr>
-                </a:solidFill>
-                <a:latin typeface="Futura Medium" panose="020B0602020204020303" pitchFamily="34" charset="-79"/>
-                <a:cs typeface="Futura Medium" panose="020B0602020204020303" pitchFamily="34" charset="-79"/>
-              </a:rPr>
-              <a:t>What</a:t>
-            </a:r>
-            <a:r>
-              <a:rPr lang="pl-PL" dirty="0">
-                <a:solidFill>
-                  <a:schemeClr val="bg2">
-                    <a:lumMod val="90000"/>
-                  </a:schemeClr>
-                </a:solidFill>
-                <a:latin typeface="Futura Medium" panose="020B0602020204020303" pitchFamily="34" charset="-79"/>
-                <a:cs typeface="Futura Medium" panose="020B0602020204020303" pitchFamily="34" charset="-79"/>
-              </a:rPr>
-              <a:t> </a:t>
-            </a:r>
-            <a:r>
-              <a:rPr lang="pl-PL" dirty="0" err="1">
-                <a:solidFill>
-                  <a:schemeClr val="bg2">
-                    <a:lumMod val="90000"/>
-                  </a:schemeClr>
-                </a:solidFill>
-                <a:latin typeface="Futura Medium" panose="020B0602020204020303" pitchFamily="34" charset="-79"/>
-                <a:cs typeface="Futura Medium" panose="020B0602020204020303" pitchFamily="34" charset="-79"/>
-              </a:rPr>
-              <a:t>mostly</a:t>
-            </a:r>
-            <a:r>
-              <a:rPr lang="pl-PL" dirty="0">
-                <a:solidFill>
-                  <a:schemeClr val="bg2">
-                    <a:lumMod val="90000"/>
-                  </a:schemeClr>
-                </a:solidFill>
-                <a:latin typeface="Futura Medium" panose="020B0602020204020303" pitchFamily="34" charset="-79"/>
-                <a:cs typeface="Futura Medium" panose="020B0602020204020303" pitchFamily="34" charset="-79"/>
-              </a:rPr>
-              <a:t> </a:t>
-            </a:r>
-            <a:r>
-              <a:rPr lang="pl-PL" dirty="0" err="1">
-                <a:solidFill>
-                  <a:schemeClr val="bg2">
-                    <a:lumMod val="90000"/>
-                  </a:schemeClr>
-                </a:solidFill>
-                <a:latin typeface="Futura Medium" panose="020B0602020204020303" pitchFamily="34" charset="-79"/>
-                <a:cs typeface="Futura Medium" panose="020B0602020204020303" pitchFamily="34" charset="-79"/>
-              </a:rPr>
-              <a:t>impacted</a:t>
-            </a:r>
-            <a:r>
-              <a:rPr lang="pl-PL" dirty="0">
-                <a:solidFill>
-                  <a:schemeClr val="bg2">
-                    <a:lumMod val="90000"/>
-                  </a:schemeClr>
-                </a:solidFill>
-                <a:latin typeface="Futura Medium" panose="020B0602020204020303" pitchFamily="34" charset="-79"/>
-                <a:cs typeface="Futura Medium" panose="020B0602020204020303" pitchFamily="34" charset="-79"/>
-              </a:rPr>
-              <a:t> </a:t>
-            </a:r>
-            <a:r>
-              <a:rPr lang="pl-PL" dirty="0" err="1">
-                <a:solidFill>
-                  <a:schemeClr val="bg2">
-                    <a:lumMod val="90000"/>
-                  </a:schemeClr>
-                </a:solidFill>
-                <a:latin typeface="Futura Medium" panose="020B0602020204020303" pitchFamily="34" charset="-79"/>
-                <a:cs typeface="Futura Medium" panose="020B0602020204020303" pitchFamily="34" charset="-79"/>
-              </a:rPr>
-              <a:t>results</a:t>
-            </a:r>
-            <a:r>
-              <a:rPr lang="pl-PL" dirty="0">
-                <a:solidFill>
-                  <a:schemeClr val="bg2">
-                    <a:lumMod val="90000"/>
-                  </a:schemeClr>
-                </a:solidFill>
-                <a:latin typeface="Futura Medium" panose="020B0602020204020303" pitchFamily="34" charset="-79"/>
-                <a:cs typeface="Futura Medium" panose="020B0602020204020303" pitchFamily="34" charset="-79"/>
-              </a:rPr>
-              <a:t>?</a:t>
-            </a:r>
-          </a:p>
-          <a:p>
-            <a:pPr marL="514350" indent="-514350">
-              <a:buClr>
-                <a:schemeClr val="accent2"/>
-              </a:buClr>
-              <a:buFont typeface="+mj-lt"/>
-              <a:buAutoNum type="arabicPeriod"/>
-            </a:pPr>
-            <a:r>
-              <a:rPr lang="pl-PL" dirty="0" err="1">
-                <a:solidFill>
-                  <a:schemeClr val="bg2">
-                    <a:lumMod val="90000"/>
-                  </a:schemeClr>
-                </a:solidFill>
-                <a:latin typeface="Futura Medium" panose="020B0602020204020303" pitchFamily="34" charset="-79"/>
-                <a:cs typeface="Futura Medium" panose="020B0602020204020303" pitchFamily="34" charset="-79"/>
-              </a:rPr>
-              <a:t>Deliverables</a:t>
-            </a:r>
-            <a:endParaRPr lang="pl-PL" dirty="0">
-              <a:solidFill>
-                <a:schemeClr val="bg2">
-                  <a:lumMod val="90000"/>
-                </a:schemeClr>
-              </a:solidFill>
-              <a:latin typeface="Futura Medium" panose="020B0602020204020303" pitchFamily="34" charset="-79"/>
-              <a:cs typeface="Futura Medium" panose="020B0602020204020303" pitchFamily="34" charset="-79"/>
-            </a:endParaRPr>
-          </a:p>
-          <a:p>
-            <a:pPr marL="0" indent="0">
-              <a:buNone/>
-            </a:pPr>
-            <a:endParaRPr lang="pl-PL" dirty="0"/>
-          </a:p>
-        </p:txBody>
-      </p:sp>
-    </p:spTree>
-    <p:extLst>
-      <p:ext uri="{BB962C8B-B14F-4D97-AF65-F5344CB8AC3E}">
-        <p14:creationId xmlns:p14="http://schemas.microsoft.com/office/powerpoint/2010/main" val="4087740901"/>
-      </p:ext>
-    </p:extLst>
-  </p:cSld>
-  <p:clrMapOvr>
-    <a:masterClrMapping/>
-  </p:clrMapOvr>
-</p:sld>
-</file>
-
-<file path=ppt/slides/slide30.xml><?xml version="1.0" encoding="utf-8"?>
-<p:sld xmlns:a="http://schemas.openxmlformats.org/drawingml/2006/main" xmlns:r="http://schemas.openxmlformats.org/officeDocument/2006/relationships" xmlns:p="http://schemas.openxmlformats.org/presentationml/2006/main">
-  <p:cSld>
-    <p:spTree>
-      <p:nvGrpSpPr>
-        <p:cNvPr id="1" name=""/>
-        <p:cNvGrpSpPr/>
-        <p:nvPr/>
-      </p:nvGrpSpPr>
-      <p:grpSpPr>
-        <a:xfrm>
-          <a:off x="0" y="0"/>
-          <a:ext cx="0" cy="0"/>
-          <a:chOff x="0" y="0"/>
-          <a:chExt cx="0" cy="0"/>
-        </a:xfrm>
-      </p:grpSpPr>
-      <p:sp>
-        <p:nvSpPr>
-          <p:cNvPr id="2" name="Title 1">
-            <a:extLst>
-              <a:ext uri="{FF2B5EF4-FFF2-40B4-BE49-F238E27FC236}">
-                <a16:creationId xmlns:a16="http://schemas.microsoft.com/office/drawing/2014/main" id="{F47BF6D4-89AF-724D-982F-87CBD8F29B01}"/>
-              </a:ext>
-            </a:extLst>
-          </p:cNvPr>
-          <p:cNvSpPr>
-            <a:spLocks noGrp="1"/>
-          </p:cNvSpPr>
-          <p:nvPr>
-            <p:ph type="title"/>
-          </p:nvPr>
-        </p:nvSpPr>
-        <p:spPr/>
-        <p:txBody>
-          <a:bodyPr>
-            <a:normAutofit/>
-          </a:bodyPr>
-          <a:lstStyle/>
-          <a:p>
-            <a:pPr algn="ctr"/>
-            <a:r>
-              <a:rPr lang="pl-PL" sz="3200" dirty="0">
-                <a:solidFill>
-                  <a:schemeClr val="accent1">
-                    <a:lumMod val="75000"/>
-                  </a:schemeClr>
-                </a:solidFill>
-                <a:latin typeface="Futura Medium" panose="020B0602020204020303" pitchFamily="34" charset="-79"/>
-                <a:cs typeface="Futura Medium" panose="020B0602020204020303" pitchFamily="34" charset="-79"/>
-              </a:rPr>
-              <a:t>Agenda</a:t>
-            </a:r>
-          </a:p>
-        </p:txBody>
-      </p:sp>
-      <p:sp>
-        <p:nvSpPr>
-          <p:cNvPr id="3" name="Content Placeholder 2">
-            <a:extLst>
-              <a:ext uri="{FF2B5EF4-FFF2-40B4-BE49-F238E27FC236}">
-                <a16:creationId xmlns:a16="http://schemas.microsoft.com/office/drawing/2014/main" id="{37567E70-E983-FC41-9D5E-32F7CA0480D4}"/>
-              </a:ext>
-            </a:extLst>
-          </p:cNvPr>
-          <p:cNvSpPr>
-            <a:spLocks noGrp="1"/>
-          </p:cNvSpPr>
-          <p:nvPr>
-            <p:ph idx="1"/>
-          </p:nvPr>
-        </p:nvSpPr>
-        <p:spPr/>
-        <p:txBody>
-          <a:bodyPr>
-            <a:normAutofit/>
-          </a:bodyPr>
-          <a:lstStyle/>
-          <a:p>
-            <a:pPr marL="514350" indent="-514350">
-              <a:buClr>
-                <a:schemeClr val="accent2"/>
-              </a:buClr>
-              <a:buFont typeface="+mj-lt"/>
-              <a:buAutoNum type="arabicPeriod"/>
-            </a:pPr>
-            <a:r>
-              <a:rPr lang="pl-PL" dirty="0">
-                <a:solidFill>
                   <a:schemeClr val="bg2">
                     <a:lumMod val="90000"/>
                   </a:schemeClr>
@@ -34835,7 +35484,7 @@
 </p:sld>
 </file>
 
-<file path=ppt/slides/slide31.xml><?xml version="1.0" encoding="utf-8"?>
+<file path=ppt/slides/slide32.xml><?xml version="1.0" encoding="utf-8"?>
 <p:sld xmlns:a="http://schemas.openxmlformats.org/drawingml/2006/main" xmlns:r="http://schemas.openxmlformats.org/officeDocument/2006/relationships" xmlns:p="http://schemas.openxmlformats.org/presentationml/2006/main">
   <p:cSld>
     <p:spTree>
@@ -35961,7 +36610,7 @@
             <p:ph idx="1"/>
             <p:extLst>
               <p:ext uri="{D42A27DB-BD31-4B8C-83A1-F6EECF244321}">
-                <p14:modId xmlns:p14="http://schemas.microsoft.com/office/powerpoint/2010/main" val="2395168974"/>
+                <p14:modId xmlns:p14="http://schemas.microsoft.com/office/powerpoint/2010/main" val="3245631084"/>
               </p:ext>
             </p:extLst>
           </p:nvPr>
@@ -37213,7 +37862,7 @@
                           <a:latin typeface="Futura Medium" panose="020B0602020204020303" pitchFamily="34" charset="-79"/>
                           <a:cs typeface="Futura Medium" panose="020B0602020204020303" pitchFamily="34" charset="-79"/>
                         </a:rPr>
-                        <a:t>name</a:t>
+                        <a:t>offer_code</a:t>
                       </a:r>
                       <a:endParaRPr lang="pl-PL" sz="1400" dirty="0">
                         <a:solidFill>
@@ -37292,19 +37941,21 @@
                       <a:r>
                         <a:rPr lang="pl-PL" sz="1400" dirty="0" err="1">
                           <a:solidFill>
-                            <a:schemeClr val="bg2">
-                              <a:lumMod val="90000"/>
+                            <a:schemeClr val="accent1">
+                              <a:lumMod val="60000"/>
+                              <a:lumOff val="40000"/>
                             </a:schemeClr>
                           </a:solidFill>
                           <a:latin typeface="Futura Medium" panose="020B0602020204020303" pitchFamily="34" charset="-79"/>
                           <a:cs typeface="Futura Medium" panose="020B0602020204020303" pitchFamily="34" charset="-79"/>
                         </a:rPr>
-                        <a:t>offer_code</a:t>
+                        <a:t>name</a:t>
                       </a:r>
                       <a:endParaRPr lang="pl-PL" sz="1400" dirty="0">
                         <a:solidFill>
-                          <a:schemeClr val="bg2">
-                            <a:lumMod val="90000"/>
+                          <a:schemeClr val="accent1">
+                            <a:lumMod val="60000"/>
+                            <a:lumOff val="40000"/>
                           </a:schemeClr>
                         </a:solidFill>
                         <a:latin typeface="Futura Medium" panose="020B0602020204020303" pitchFamily="34" charset="-79"/>
@@ -37378,8 +38029,9 @@
                       <a:r>
                         <a:rPr lang="pl-PL" sz="1400" dirty="0" err="1">
                           <a:solidFill>
-                            <a:schemeClr val="bg2">
-                              <a:lumMod val="90000"/>
+                            <a:schemeClr val="accent1">
+                              <a:lumMod val="60000"/>
+                              <a:lumOff val="40000"/>
                             </a:schemeClr>
                           </a:solidFill>
                           <a:latin typeface="Futura Medium" panose="020B0602020204020303" pitchFamily="34" charset="-79"/>
@@ -37389,8 +38041,9 @@
                       </a:r>
                       <a:endParaRPr lang="pl-PL" sz="1400" dirty="0">
                         <a:solidFill>
-                          <a:schemeClr val="bg2">
-                            <a:lumMod val="90000"/>
+                          <a:schemeClr val="accent1">
+                            <a:lumMod val="60000"/>
+                            <a:lumOff val="40000"/>
                           </a:schemeClr>
                         </a:solidFill>
                         <a:latin typeface="Futura Medium" panose="020B0602020204020303" pitchFamily="34" charset="-79"/>

</xml_diff>